<commit_message>
Fixed many of Tommy's comments Fixed figures are more uniform now Added another step in the HOP-HMM development moved old stuff to old folder \ old PPT
</commit_message>
<xml_diff>
--- a/Help/old/old_figures.pptx
+++ b/Help/old/old_figures.pptx
@@ -6,10 +6,11 @@
   </p:sldMasterIdLst>
   <p:sldIdLst>
     <p:sldId id="259" r:id="rId2"/>
-    <p:sldId id="260" r:id="rId3"/>
-    <p:sldId id="261" r:id="rId4"/>
-    <p:sldId id="257" r:id="rId5"/>
-    <p:sldId id="258" r:id="rId6"/>
+    <p:sldId id="262" r:id="rId3"/>
+    <p:sldId id="260" r:id="rId4"/>
+    <p:sldId id="261" r:id="rId5"/>
+    <p:sldId id="257" r:id="rId6"/>
+    <p:sldId id="258" r:id="rId7"/>
   </p:sldIdLst>
   <p:sldSz cx="12192000" cy="6858000"/>
   <p:notesSz cx="6858000" cy="9144000"/>
@@ -258,7 +259,7 @@
           <a:p>
             <a:fld id="{7CD7659D-D667-4AFA-9748-DCD10C6EC294}" type="datetimeFigureOut">
               <a:rPr lang="en-US" smtClean="0"/>
-              <a:t>2019-05-30</a:t>
+              <a:t>2019-06-03</a:t>
             </a:fld>
             <a:endParaRPr lang="en-US"/>
           </a:p>
@@ -428,7 +429,7 @@
           <a:p>
             <a:fld id="{7CD7659D-D667-4AFA-9748-DCD10C6EC294}" type="datetimeFigureOut">
               <a:rPr lang="en-US" smtClean="0"/>
-              <a:t>2019-05-30</a:t>
+              <a:t>2019-06-03</a:t>
             </a:fld>
             <a:endParaRPr lang="en-US"/>
           </a:p>
@@ -608,7 +609,7 @@
           <a:p>
             <a:fld id="{7CD7659D-D667-4AFA-9748-DCD10C6EC294}" type="datetimeFigureOut">
               <a:rPr lang="en-US" smtClean="0"/>
-              <a:t>2019-05-30</a:t>
+              <a:t>2019-06-03</a:t>
             </a:fld>
             <a:endParaRPr lang="en-US"/>
           </a:p>
@@ -778,7 +779,7 @@
           <a:p>
             <a:fld id="{7CD7659D-D667-4AFA-9748-DCD10C6EC294}" type="datetimeFigureOut">
               <a:rPr lang="en-US" smtClean="0"/>
-              <a:t>2019-05-30</a:t>
+              <a:t>2019-06-03</a:t>
             </a:fld>
             <a:endParaRPr lang="en-US"/>
           </a:p>
@@ -1024,7 +1025,7 @@
           <a:p>
             <a:fld id="{7CD7659D-D667-4AFA-9748-DCD10C6EC294}" type="datetimeFigureOut">
               <a:rPr lang="en-US" smtClean="0"/>
-              <a:t>2019-05-30</a:t>
+              <a:t>2019-06-03</a:t>
             </a:fld>
             <a:endParaRPr lang="en-US"/>
           </a:p>
@@ -1256,7 +1257,7 @@
           <a:p>
             <a:fld id="{7CD7659D-D667-4AFA-9748-DCD10C6EC294}" type="datetimeFigureOut">
               <a:rPr lang="en-US" smtClean="0"/>
-              <a:t>2019-05-30</a:t>
+              <a:t>2019-06-03</a:t>
             </a:fld>
             <a:endParaRPr lang="en-US"/>
           </a:p>
@@ -1623,7 +1624,7 @@
           <a:p>
             <a:fld id="{7CD7659D-D667-4AFA-9748-DCD10C6EC294}" type="datetimeFigureOut">
               <a:rPr lang="en-US" smtClean="0"/>
-              <a:t>2019-05-30</a:t>
+              <a:t>2019-06-03</a:t>
             </a:fld>
             <a:endParaRPr lang="en-US"/>
           </a:p>
@@ -1741,7 +1742,7 @@
           <a:p>
             <a:fld id="{7CD7659D-D667-4AFA-9748-DCD10C6EC294}" type="datetimeFigureOut">
               <a:rPr lang="en-US" smtClean="0"/>
-              <a:t>2019-05-30</a:t>
+              <a:t>2019-06-03</a:t>
             </a:fld>
             <a:endParaRPr lang="en-US"/>
           </a:p>
@@ -1836,7 +1837,7 @@
           <a:p>
             <a:fld id="{7CD7659D-D667-4AFA-9748-DCD10C6EC294}" type="datetimeFigureOut">
               <a:rPr lang="en-US" smtClean="0"/>
-              <a:t>2019-05-30</a:t>
+              <a:t>2019-06-03</a:t>
             </a:fld>
             <a:endParaRPr lang="en-US"/>
           </a:p>
@@ -2113,7 +2114,7 @@
           <a:p>
             <a:fld id="{7CD7659D-D667-4AFA-9748-DCD10C6EC294}" type="datetimeFigureOut">
               <a:rPr lang="en-US" smtClean="0"/>
-              <a:t>2019-05-30</a:t>
+              <a:t>2019-06-03</a:t>
             </a:fld>
             <a:endParaRPr lang="en-US"/>
           </a:p>
@@ -2366,7 +2367,7 @@
           <a:p>
             <a:fld id="{7CD7659D-D667-4AFA-9748-DCD10C6EC294}" type="datetimeFigureOut">
               <a:rPr lang="en-US" smtClean="0"/>
-              <a:t>2019-05-30</a:t>
+              <a:t>2019-06-03</a:t>
             </a:fld>
             <a:endParaRPr lang="en-US"/>
           </a:p>
@@ -2579,7 +2580,7 @@
           <a:p>
             <a:fld id="{7CD7659D-D667-4AFA-9748-DCD10C6EC294}" type="datetimeFigureOut">
               <a:rPr lang="en-US" smtClean="0"/>
-              <a:t>2019-05-30</a:t>
+              <a:t>2019-06-03</a:t>
             </a:fld>
             <a:endParaRPr lang="en-US"/>
           </a:p>
@@ -4217,6 +4218,4407 @@
       </p:grpSpPr>
       <p:grpSp>
         <p:nvGrpSpPr>
+          <p:cNvPr id="2" name="Group 1"/>
+          <p:cNvGrpSpPr/>
+          <p:nvPr/>
+        </p:nvGrpSpPr>
+        <p:grpSpPr>
+          <a:xfrm>
+            <a:off x="1026644" y="1672484"/>
+            <a:ext cx="9740131" cy="3202683"/>
+            <a:chOff x="2561530" y="1131309"/>
+            <a:chExt cx="9740131" cy="3202683"/>
+          </a:xfrm>
+        </p:grpSpPr>
+        <p:sp>
+          <p:nvSpPr>
+            <p:cNvPr id="30" name="Rectangle 29"/>
+            <p:cNvSpPr/>
+            <p:nvPr/>
+          </p:nvSpPr>
+          <p:spPr>
+            <a:xfrm>
+              <a:off x="6603111" y="2064797"/>
+              <a:ext cx="457599" cy="453839"/>
+            </a:xfrm>
+            <a:prstGeom prst="rect">
+              <a:avLst/>
+            </a:prstGeom>
+            <a:solidFill>
+              <a:schemeClr val="accent1">
+                <a:lumMod val="40000"/>
+                <a:lumOff val="60000"/>
+              </a:schemeClr>
+            </a:solidFill>
+          </p:spPr>
+          <p:style>
+            <a:lnRef idx="2">
+              <a:schemeClr val="accent1">
+                <a:shade val="50000"/>
+              </a:schemeClr>
+            </a:lnRef>
+            <a:fillRef idx="1">
+              <a:schemeClr val="accent1"/>
+            </a:fillRef>
+            <a:effectRef idx="0">
+              <a:schemeClr val="accent1"/>
+            </a:effectRef>
+            <a:fontRef idx="minor">
+              <a:schemeClr val="lt1"/>
+            </a:fontRef>
+          </p:style>
+          <p:txBody>
+            <a:bodyPr rtlCol="0" anchor="ctr"/>
+            <a:lstStyle/>
+            <a:p>
+              <a:pPr algn="ctr"/>
+              <a:endParaRPr lang="en-US" dirty="0"/>
+            </a:p>
+          </p:txBody>
+        </p:sp>
+        <p:sp>
+          <p:nvSpPr>
+            <p:cNvPr id="33" name="Rectangle 32"/>
+            <p:cNvSpPr/>
+            <p:nvPr/>
+          </p:nvSpPr>
+          <p:spPr>
+            <a:xfrm>
+              <a:off x="7060710" y="2064797"/>
+              <a:ext cx="457599" cy="453839"/>
+            </a:xfrm>
+            <a:prstGeom prst="rect">
+              <a:avLst/>
+            </a:prstGeom>
+            <a:solidFill>
+              <a:schemeClr val="accent1">
+                <a:lumMod val="40000"/>
+                <a:lumOff val="60000"/>
+              </a:schemeClr>
+            </a:solidFill>
+          </p:spPr>
+          <p:style>
+            <a:lnRef idx="2">
+              <a:schemeClr val="accent1">
+                <a:shade val="50000"/>
+              </a:schemeClr>
+            </a:lnRef>
+            <a:fillRef idx="1">
+              <a:schemeClr val="accent1"/>
+            </a:fillRef>
+            <a:effectRef idx="0">
+              <a:schemeClr val="accent1"/>
+            </a:effectRef>
+            <a:fontRef idx="minor">
+              <a:schemeClr val="lt1"/>
+            </a:fontRef>
+          </p:style>
+          <p:txBody>
+            <a:bodyPr rtlCol="0" anchor="ctr"/>
+            <a:lstStyle/>
+            <a:p>
+              <a:pPr algn="ctr"/>
+              <a:endParaRPr lang="en-US" dirty="0"/>
+            </a:p>
+          </p:txBody>
+        </p:sp>
+        <p:sp>
+          <p:nvSpPr>
+            <p:cNvPr id="35" name="Rectangle 34"/>
+            <p:cNvSpPr/>
+            <p:nvPr/>
+          </p:nvSpPr>
+          <p:spPr>
+            <a:xfrm>
+              <a:off x="6603111" y="2518636"/>
+              <a:ext cx="457599" cy="453839"/>
+            </a:xfrm>
+            <a:prstGeom prst="rect">
+              <a:avLst/>
+            </a:prstGeom>
+            <a:solidFill>
+              <a:schemeClr val="accent6"/>
+            </a:solidFill>
+          </p:spPr>
+          <p:style>
+            <a:lnRef idx="2">
+              <a:schemeClr val="accent1">
+                <a:shade val="50000"/>
+              </a:schemeClr>
+            </a:lnRef>
+            <a:fillRef idx="1">
+              <a:schemeClr val="accent1"/>
+            </a:fillRef>
+            <a:effectRef idx="0">
+              <a:schemeClr val="accent1"/>
+            </a:effectRef>
+            <a:fontRef idx="minor">
+              <a:schemeClr val="lt1"/>
+            </a:fontRef>
+          </p:style>
+          <p:txBody>
+            <a:bodyPr rtlCol="0" anchor="ctr"/>
+            <a:lstStyle/>
+            <a:p>
+              <a:pPr algn="ctr"/>
+              <a:endParaRPr lang="en-US" sz="900" dirty="0"/>
+            </a:p>
+          </p:txBody>
+        </p:sp>
+        <p:sp>
+          <p:nvSpPr>
+            <p:cNvPr id="38" name="Rectangle 37"/>
+            <p:cNvSpPr/>
+            <p:nvPr/>
+          </p:nvSpPr>
+          <p:spPr>
+            <a:xfrm>
+              <a:off x="7060710" y="2518636"/>
+              <a:ext cx="457599" cy="453839"/>
+            </a:xfrm>
+            <a:prstGeom prst="rect">
+              <a:avLst/>
+            </a:prstGeom>
+            <a:solidFill>
+              <a:schemeClr val="accent6"/>
+            </a:solidFill>
+          </p:spPr>
+          <p:style>
+            <a:lnRef idx="2">
+              <a:schemeClr val="accent1">
+                <a:shade val="50000"/>
+              </a:schemeClr>
+            </a:lnRef>
+            <a:fillRef idx="1">
+              <a:schemeClr val="accent1"/>
+            </a:fillRef>
+            <a:effectRef idx="0">
+              <a:schemeClr val="accent1"/>
+            </a:effectRef>
+            <a:fontRef idx="minor">
+              <a:schemeClr val="lt1"/>
+            </a:fontRef>
+          </p:style>
+          <p:txBody>
+            <a:bodyPr rtlCol="0" anchor="ctr"/>
+            <a:lstStyle/>
+            <a:p>
+              <a:pPr algn="ctr"/>
+              <a:endParaRPr lang="en-US" dirty="0"/>
+            </a:p>
+          </p:txBody>
+        </p:sp>
+        <p:sp>
+          <p:nvSpPr>
+            <p:cNvPr id="40" name="Rectangle 39"/>
+            <p:cNvSpPr/>
+            <p:nvPr/>
+          </p:nvSpPr>
+          <p:spPr>
+            <a:xfrm>
+              <a:off x="7518309" y="2064797"/>
+              <a:ext cx="457599" cy="453839"/>
+            </a:xfrm>
+            <a:prstGeom prst="rect">
+              <a:avLst/>
+            </a:prstGeom>
+            <a:solidFill>
+              <a:schemeClr val="accent1">
+                <a:lumMod val="40000"/>
+                <a:lumOff val="60000"/>
+              </a:schemeClr>
+            </a:solidFill>
+          </p:spPr>
+          <p:style>
+            <a:lnRef idx="2">
+              <a:schemeClr val="accent1">
+                <a:shade val="50000"/>
+              </a:schemeClr>
+            </a:lnRef>
+            <a:fillRef idx="1">
+              <a:schemeClr val="accent1"/>
+            </a:fillRef>
+            <a:effectRef idx="0">
+              <a:schemeClr val="accent1"/>
+            </a:effectRef>
+            <a:fontRef idx="minor">
+              <a:schemeClr val="lt1"/>
+            </a:fontRef>
+          </p:style>
+          <p:txBody>
+            <a:bodyPr rtlCol="0" anchor="ctr"/>
+            <a:lstStyle/>
+            <a:p>
+              <a:pPr algn="ctr"/>
+              <a:endParaRPr lang="en-US" dirty="0"/>
+            </a:p>
+          </p:txBody>
+        </p:sp>
+        <p:sp>
+          <p:nvSpPr>
+            <p:cNvPr id="43" name="Rectangle 42"/>
+            <p:cNvSpPr/>
+            <p:nvPr/>
+          </p:nvSpPr>
+          <p:spPr>
+            <a:xfrm>
+              <a:off x="7975908" y="2064797"/>
+              <a:ext cx="457599" cy="453839"/>
+            </a:xfrm>
+            <a:prstGeom prst="rect">
+              <a:avLst/>
+            </a:prstGeom>
+            <a:solidFill>
+              <a:schemeClr val="accent1">
+                <a:lumMod val="40000"/>
+                <a:lumOff val="60000"/>
+              </a:schemeClr>
+            </a:solidFill>
+          </p:spPr>
+          <p:style>
+            <a:lnRef idx="2">
+              <a:schemeClr val="accent1">
+                <a:shade val="50000"/>
+              </a:schemeClr>
+            </a:lnRef>
+            <a:fillRef idx="1">
+              <a:schemeClr val="accent1"/>
+            </a:fillRef>
+            <a:effectRef idx="0">
+              <a:schemeClr val="accent1"/>
+            </a:effectRef>
+            <a:fontRef idx="minor">
+              <a:schemeClr val="lt1"/>
+            </a:fontRef>
+          </p:style>
+          <p:txBody>
+            <a:bodyPr rtlCol="0" anchor="ctr"/>
+            <a:lstStyle/>
+            <a:p>
+              <a:pPr algn="ctr"/>
+              <a:endParaRPr lang="en-US" dirty="0"/>
+            </a:p>
+          </p:txBody>
+        </p:sp>
+        <p:sp>
+          <p:nvSpPr>
+            <p:cNvPr id="44" name="Rectangle 43"/>
+            <p:cNvSpPr/>
+            <p:nvPr/>
+          </p:nvSpPr>
+          <p:spPr>
+            <a:xfrm>
+              <a:off x="7518309" y="2518636"/>
+              <a:ext cx="457599" cy="453839"/>
+            </a:xfrm>
+            <a:prstGeom prst="rect">
+              <a:avLst/>
+            </a:prstGeom>
+            <a:solidFill>
+              <a:schemeClr val="accent6"/>
+            </a:solidFill>
+          </p:spPr>
+          <p:style>
+            <a:lnRef idx="2">
+              <a:schemeClr val="accent1">
+                <a:shade val="50000"/>
+              </a:schemeClr>
+            </a:lnRef>
+            <a:fillRef idx="1">
+              <a:schemeClr val="accent1"/>
+            </a:fillRef>
+            <a:effectRef idx="0">
+              <a:schemeClr val="accent1"/>
+            </a:effectRef>
+            <a:fontRef idx="minor">
+              <a:schemeClr val="lt1"/>
+            </a:fontRef>
+          </p:style>
+          <p:txBody>
+            <a:bodyPr rtlCol="0" anchor="ctr"/>
+            <a:lstStyle/>
+            <a:p>
+              <a:pPr algn="ctr"/>
+              <a:endParaRPr lang="en-US" dirty="0"/>
+            </a:p>
+          </p:txBody>
+        </p:sp>
+        <p:sp>
+          <p:nvSpPr>
+            <p:cNvPr id="45" name="Rectangle 44"/>
+            <p:cNvSpPr/>
+            <p:nvPr/>
+          </p:nvSpPr>
+          <p:spPr>
+            <a:xfrm>
+              <a:off x="7975908" y="2518636"/>
+              <a:ext cx="457599" cy="453839"/>
+            </a:xfrm>
+            <a:prstGeom prst="rect">
+              <a:avLst/>
+            </a:prstGeom>
+            <a:solidFill>
+              <a:schemeClr val="accent6"/>
+            </a:solidFill>
+          </p:spPr>
+          <p:style>
+            <a:lnRef idx="2">
+              <a:schemeClr val="accent1">
+                <a:shade val="50000"/>
+              </a:schemeClr>
+            </a:lnRef>
+            <a:fillRef idx="1">
+              <a:schemeClr val="accent1"/>
+            </a:fillRef>
+            <a:effectRef idx="0">
+              <a:schemeClr val="accent1"/>
+            </a:effectRef>
+            <a:fontRef idx="minor">
+              <a:schemeClr val="lt1"/>
+            </a:fontRef>
+          </p:style>
+          <p:txBody>
+            <a:bodyPr rtlCol="0" anchor="ctr"/>
+            <a:lstStyle/>
+            <a:p>
+              <a:pPr algn="ctr"/>
+              <a:endParaRPr lang="en-US" dirty="0"/>
+            </a:p>
+          </p:txBody>
+        </p:sp>
+        <p:sp>
+          <p:nvSpPr>
+            <p:cNvPr id="46" name="Rectangle 45"/>
+            <p:cNvSpPr/>
+            <p:nvPr/>
+          </p:nvSpPr>
+          <p:spPr>
+            <a:xfrm>
+              <a:off x="6603111" y="2972475"/>
+              <a:ext cx="457599" cy="453839"/>
+            </a:xfrm>
+            <a:prstGeom prst="rect">
+              <a:avLst/>
+            </a:prstGeom>
+            <a:solidFill>
+              <a:schemeClr val="accent1">
+                <a:lumMod val="40000"/>
+                <a:lumOff val="60000"/>
+              </a:schemeClr>
+            </a:solidFill>
+          </p:spPr>
+          <p:style>
+            <a:lnRef idx="2">
+              <a:schemeClr val="accent1">
+                <a:shade val="50000"/>
+              </a:schemeClr>
+            </a:lnRef>
+            <a:fillRef idx="1">
+              <a:schemeClr val="accent1"/>
+            </a:fillRef>
+            <a:effectRef idx="0">
+              <a:schemeClr val="accent1"/>
+            </a:effectRef>
+            <a:fontRef idx="minor">
+              <a:schemeClr val="lt1"/>
+            </a:fontRef>
+          </p:style>
+          <p:txBody>
+            <a:bodyPr rtlCol="0" anchor="ctr"/>
+            <a:lstStyle/>
+            <a:p>
+              <a:pPr algn="ctr"/>
+              <a:endParaRPr lang="en-US" dirty="0"/>
+            </a:p>
+          </p:txBody>
+        </p:sp>
+        <p:sp>
+          <p:nvSpPr>
+            <p:cNvPr id="49" name="Rectangle 48"/>
+            <p:cNvSpPr/>
+            <p:nvPr/>
+          </p:nvSpPr>
+          <p:spPr>
+            <a:xfrm>
+              <a:off x="7060710" y="2972475"/>
+              <a:ext cx="457599" cy="453839"/>
+            </a:xfrm>
+            <a:prstGeom prst="rect">
+              <a:avLst/>
+            </a:prstGeom>
+            <a:solidFill>
+              <a:schemeClr val="accent1">
+                <a:lumMod val="40000"/>
+                <a:lumOff val="60000"/>
+              </a:schemeClr>
+            </a:solidFill>
+          </p:spPr>
+          <p:style>
+            <a:lnRef idx="2">
+              <a:schemeClr val="accent1">
+                <a:shade val="50000"/>
+              </a:schemeClr>
+            </a:lnRef>
+            <a:fillRef idx="1">
+              <a:schemeClr val="accent1"/>
+            </a:fillRef>
+            <a:effectRef idx="0">
+              <a:schemeClr val="accent1"/>
+            </a:effectRef>
+            <a:fontRef idx="minor">
+              <a:schemeClr val="lt1"/>
+            </a:fontRef>
+          </p:style>
+          <p:txBody>
+            <a:bodyPr rtlCol="0" anchor="ctr"/>
+            <a:lstStyle/>
+            <a:p>
+              <a:pPr algn="ctr"/>
+              <a:endParaRPr lang="en-US" dirty="0"/>
+            </a:p>
+          </p:txBody>
+        </p:sp>
+        <p:sp>
+          <p:nvSpPr>
+            <p:cNvPr id="50" name="Rectangle 49"/>
+            <p:cNvSpPr/>
+            <p:nvPr/>
+          </p:nvSpPr>
+          <p:spPr>
+            <a:xfrm>
+              <a:off x="6603111" y="3426314"/>
+              <a:ext cx="457599" cy="453839"/>
+            </a:xfrm>
+            <a:prstGeom prst="rect">
+              <a:avLst/>
+            </a:prstGeom>
+            <a:solidFill>
+              <a:schemeClr val="accent1">
+                <a:lumMod val="40000"/>
+                <a:lumOff val="60000"/>
+              </a:schemeClr>
+            </a:solidFill>
+          </p:spPr>
+          <p:style>
+            <a:lnRef idx="2">
+              <a:schemeClr val="accent1">
+                <a:shade val="50000"/>
+              </a:schemeClr>
+            </a:lnRef>
+            <a:fillRef idx="1">
+              <a:schemeClr val="accent1"/>
+            </a:fillRef>
+            <a:effectRef idx="0">
+              <a:schemeClr val="accent1"/>
+            </a:effectRef>
+            <a:fontRef idx="minor">
+              <a:schemeClr val="lt1"/>
+            </a:fontRef>
+          </p:style>
+          <p:txBody>
+            <a:bodyPr rtlCol="0" anchor="ctr"/>
+            <a:lstStyle/>
+            <a:p>
+              <a:pPr algn="ctr"/>
+              <a:endParaRPr lang="en-US" dirty="0"/>
+            </a:p>
+          </p:txBody>
+        </p:sp>
+        <p:sp>
+          <p:nvSpPr>
+            <p:cNvPr id="52" name="Rectangle 51"/>
+            <p:cNvSpPr/>
+            <p:nvPr/>
+          </p:nvSpPr>
+          <p:spPr>
+            <a:xfrm>
+              <a:off x="7060710" y="3426314"/>
+              <a:ext cx="457599" cy="453839"/>
+            </a:xfrm>
+            <a:prstGeom prst="rect">
+              <a:avLst/>
+            </a:prstGeom>
+            <a:solidFill>
+              <a:schemeClr val="accent1">
+                <a:lumMod val="40000"/>
+                <a:lumOff val="60000"/>
+              </a:schemeClr>
+            </a:solidFill>
+          </p:spPr>
+          <p:style>
+            <a:lnRef idx="2">
+              <a:schemeClr val="accent1">
+                <a:shade val="50000"/>
+              </a:schemeClr>
+            </a:lnRef>
+            <a:fillRef idx="1">
+              <a:schemeClr val="accent1"/>
+            </a:fillRef>
+            <a:effectRef idx="0">
+              <a:schemeClr val="accent1"/>
+            </a:effectRef>
+            <a:fontRef idx="minor">
+              <a:schemeClr val="lt1"/>
+            </a:fontRef>
+          </p:style>
+          <p:txBody>
+            <a:bodyPr rtlCol="0" anchor="ctr"/>
+            <a:lstStyle/>
+            <a:p>
+              <a:pPr algn="ctr"/>
+              <a:endParaRPr lang="en-US" dirty="0"/>
+            </a:p>
+          </p:txBody>
+        </p:sp>
+        <p:sp>
+          <p:nvSpPr>
+            <p:cNvPr id="53" name="Rectangle 52"/>
+            <p:cNvSpPr/>
+            <p:nvPr/>
+          </p:nvSpPr>
+          <p:spPr>
+            <a:xfrm>
+              <a:off x="7518309" y="2972475"/>
+              <a:ext cx="457599" cy="453839"/>
+            </a:xfrm>
+            <a:prstGeom prst="rect">
+              <a:avLst/>
+            </a:prstGeom>
+            <a:solidFill>
+              <a:schemeClr val="accent1">
+                <a:lumMod val="40000"/>
+                <a:lumOff val="60000"/>
+              </a:schemeClr>
+            </a:solidFill>
+          </p:spPr>
+          <p:style>
+            <a:lnRef idx="2">
+              <a:schemeClr val="accent1">
+                <a:shade val="50000"/>
+              </a:schemeClr>
+            </a:lnRef>
+            <a:fillRef idx="1">
+              <a:schemeClr val="accent1"/>
+            </a:fillRef>
+            <a:effectRef idx="0">
+              <a:schemeClr val="accent1"/>
+            </a:effectRef>
+            <a:fontRef idx="minor">
+              <a:schemeClr val="lt1"/>
+            </a:fontRef>
+          </p:style>
+          <p:txBody>
+            <a:bodyPr rtlCol="0" anchor="ctr"/>
+            <a:lstStyle/>
+            <a:p>
+              <a:pPr algn="ctr"/>
+              <a:endParaRPr lang="en-US" dirty="0"/>
+            </a:p>
+          </p:txBody>
+        </p:sp>
+        <p:sp>
+          <p:nvSpPr>
+            <p:cNvPr id="55" name="Rectangle 54"/>
+            <p:cNvSpPr/>
+            <p:nvPr/>
+          </p:nvSpPr>
+          <p:spPr>
+            <a:xfrm>
+              <a:off x="7975908" y="2972475"/>
+              <a:ext cx="457599" cy="453839"/>
+            </a:xfrm>
+            <a:prstGeom prst="rect">
+              <a:avLst/>
+            </a:prstGeom>
+            <a:solidFill>
+              <a:schemeClr val="accent1">
+                <a:lumMod val="40000"/>
+                <a:lumOff val="60000"/>
+              </a:schemeClr>
+            </a:solidFill>
+          </p:spPr>
+          <p:style>
+            <a:lnRef idx="2">
+              <a:schemeClr val="accent1">
+                <a:shade val="50000"/>
+              </a:schemeClr>
+            </a:lnRef>
+            <a:fillRef idx="1">
+              <a:schemeClr val="accent1"/>
+            </a:fillRef>
+            <a:effectRef idx="0">
+              <a:schemeClr val="accent1"/>
+            </a:effectRef>
+            <a:fontRef idx="minor">
+              <a:schemeClr val="lt1"/>
+            </a:fontRef>
+          </p:style>
+          <p:txBody>
+            <a:bodyPr rtlCol="0" anchor="ctr"/>
+            <a:lstStyle/>
+            <a:p>
+              <a:pPr algn="ctr"/>
+              <a:endParaRPr lang="en-US" dirty="0"/>
+            </a:p>
+          </p:txBody>
+        </p:sp>
+        <p:sp>
+          <p:nvSpPr>
+            <p:cNvPr id="56" name="Rectangle 55"/>
+            <p:cNvSpPr/>
+            <p:nvPr/>
+          </p:nvSpPr>
+          <p:spPr>
+            <a:xfrm>
+              <a:off x="7518309" y="3426314"/>
+              <a:ext cx="457599" cy="453839"/>
+            </a:xfrm>
+            <a:prstGeom prst="rect">
+              <a:avLst/>
+            </a:prstGeom>
+            <a:solidFill>
+              <a:schemeClr val="accent1">
+                <a:lumMod val="40000"/>
+                <a:lumOff val="60000"/>
+              </a:schemeClr>
+            </a:solidFill>
+          </p:spPr>
+          <p:style>
+            <a:lnRef idx="2">
+              <a:schemeClr val="accent1">
+                <a:shade val="50000"/>
+              </a:schemeClr>
+            </a:lnRef>
+            <a:fillRef idx="1">
+              <a:schemeClr val="accent1"/>
+            </a:fillRef>
+            <a:effectRef idx="0">
+              <a:schemeClr val="accent1"/>
+            </a:effectRef>
+            <a:fontRef idx="minor">
+              <a:schemeClr val="lt1"/>
+            </a:fontRef>
+          </p:style>
+          <p:txBody>
+            <a:bodyPr rtlCol="0" anchor="ctr"/>
+            <a:lstStyle/>
+            <a:p>
+              <a:pPr algn="ctr"/>
+              <a:endParaRPr lang="en-US" dirty="0"/>
+            </a:p>
+          </p:txBody>
+        </p:sp>
+        <p:sp>
+          <p:nvSpPr>
+            <p:cNvPr id="57" name="Rectangle 56"/>
+            <p:cNvSpPr/>
+            <p:nvPr/>
+          </p:nvSpPr>
+          <p:spPr>
+            <a:xfrm>
+              <a:off x="7975908" y="3426314"/>
+              <a:ext cx="457599" cy="453839"/>
+            </a:xfrm>
+            <a:prstGeom prst="rect">
+              <a:avLst/>
+            </a:prstGeom>
+            <a:solidFill>
+              <a:schemeClr val="accent1">
+                <a:lumMod val="40000"/>
+                <a:lumOff val="60000"/>
+              </a:schemeClr>
+            </a:solidFill>
+          </p:spPr>
+          <p:style>
+            <a:lnRef idx="2">
+              <a:schemeClr val="accent1">
+                <a:shade val="50000"/>
+              </a:schemeClr>
+            </a:lnRef>
+            <a:fillRef idx="1">
+              <a:schemeClr val="accent1"/>
+            </a:fillRef>
+            <a:effectRef idx="0">
+              <a:schemeClr val="accent1"/>
+            </a:effectRef>
+            <a:fontRef idx="minor">
+              <a:schemeClr val="lt1"/>
+            </a:fontRef>
+          </p:style>
+          <p:txBody>
+            <a:bodyPr rtlCol="0" anchor="ctr"/>
+            <a:lstStyle/>
+            <a:p>
+              <a:pPr algn="ctr"/>
+              <a:endParaRPr lang="en-US" dirty="0"/>
+            </a:p>
+          </p:txBody>
+        </p:sp>
+        <p:sp>
+          <p:nvSpPr>
+            <p:cNvPr id="58" name="Rectangle 57"/>
+            <p:cNvSpPr/>
+            <p:nvPr/>
+          </p:nvSpPr>
+          <p:spPr>
+            <a:xfrm>
+              <a:off x="8433507" y="2064797"/>
+              <a:ext cx="457599" cy="453839"/>
+            </a:xfrm>
+            <a:prstGeom prst="rect">
+              <a:avLst/>
+            </a:prstGeom>
+            <a:solidFill>
+              <a:schemeClr val="accent1">
+                <a:lumMod val="40000"/>
+                <a:lumOff val="60000"/>
+              </a:schemeClr>
+            </a:solidFill>
+          </p:spPr>
+          <p:style>
+            <a:lnRef idx="2">
+              <a:schemeClr val="accent1">
+                <a:shade val="50000"/>
+              </a:schemeClr>
+            </a:lnRef>
+            <a:fillRef idx="1">
+              <a:schemeClr val="accent1"/>
+            </a:fillRef>
+            <a:effectRef idx="0">
+              <a:schemeClr val="accent1"/>
+            </a:effectRef>
+            <a:fontRef idx="minor">
+              <a:schemeClr val="lt1"/>
+            </a:fontRef>
+          </p:style>
+          <p:txBody>
+            <a:bodyPr rtlCol="0" anchor="ctr"/>
+            <a:lstStyle/>
+            <a:p>
+              <a:pPr algn="ctr"/>
+              <a:endParaRPr lang="en-US" dirty="0"/>
+            </a:p>
+          </p:txBody>
+        </p:sp>
+        <p:sp>
+          <p:nvSpPr>
+            <p:cNvPr id="59" name="Rectangle 58"/>
+            <p:cNvSpPr/>
+            <p:nvPr/>
+          </p:nvSpPr>
+          <p:spPr>
+            <a:xfrm>
+              <a:off x="8891106" y="2064797"/>
+              <a:ext cx="457599" cy="453839"/>
+            </a:xfrm>
+            <a:prstGeom prst="rect">
+              <a:avLst/>
+            </a:prstGeom>
+            <a:solidFill>
+              <a:schemeClr val="accent1">
+                <a:lumMod val="40000"/>
+                <a:lumOff val="60000"/>
+              </a:schemeClr>
+            </a:solidFill>
+          </p:spPr>
+          <p:style>
+            <a:lnRef idx="2">
+              <a:schemeClr val="accent1">
+                <a:shade val="50000"/>
+              </a:schemeClr>
+            </a:lnRef>
+            <a:fillRef idx="1">
+              <a:schemeClr val="accent1"/>
+            </a:fillRef>
+            <a:effectRef idx="0">
+              <a:schemeClr val="accent1"/>
+            </a:effectRef>
+            <a:fontRef idx="minor">
+              <a:schemeClr val="lt1"/>
+            </a:fontRef>
+          </p:style>
+          <p:txBody>
+            <a:bodyPr rtlCol="0" anchor="ctr"/>
+            <a:lstStyle/>
+            <a:p>
+              <a:pPr algn="ctr"/>
+              <a:endParaRPr lang="en-US" dirty="0"/>
+            </a:p>
+          </p:txBody>
+        </p:sp>
+        <p:sp>
+          <p:nvSpPr>
+            <p:cNvPr id="63" name="Rectangle 62"/>
+            <p:cNvSpPr/>
+            <p:nvPr/>
+          </p:nvSpPr>
+          <p:spPr>
+            <a:xfrm>
+              <a:off x="8891106" y="2518636"/>
+              <a:ext cx="457599" cy="453839"/>
+            </a:xfrm>
+            <a:prstGeom prst="rect">
+              <a:avLst/>
+            </a:prstGeom>
+            <a:solidFill>
+              <a:schemeClr val="accent6"/>
+            </a:solidFill>
+          </p:spPr>
+          <p:style>
+            <a:lnRef idx="2">
+              <a:schemeClr val="accent1">
+                <a:shade val="50000"/>
+              </a:schemeClr>
+            </a:lnRef>
+            <a:fillRef idx="1">
+              <a:schemeClr val="accent1"/>
+            </a:fillRef>
+            <a:effectRef idx="0">
+              <a:schemeClr val="accent1"/>
+            </a:effectRef>
+            <a:fontRef idx="minor">
+              <a:schemeClr val="lt1"/>
+            </a:fontRef>
+          </p:style>
+          <p:txBody>
+            <a:bodyPr rtlCol="0" anchor="ctr"/>
+            <a:lstStyle/>
+            <a:p>
+              <a:pPr algn="ctr"/>
+              <a:endParaRPr lang="en-US" dirty="0"/>
+            </a:p>
+          </p:txBody>
+        </p:sp>
+        <p:sp>
+          <p:nvSpPr>
+            <p:cNvPr id="64" name="Rectangle 63"/>
+            <p:cNvSpPr/>
+            <p:nvPr/>
+          </p:nvSpPr>
+          <p:spPr>
+            <a:xfrm>
+              <a:off x="8433507" y="2972475"/>
+              <a:ext cx="457599" cy="453839"/>
+            </a:xfrm>
+            <a:prstGeom prst="rect">
+              <a:avLst/>
+            </a:prstGeom>
+            <a:solidFill>
+              <a:schemeClr val="accent1">
+                <a:lumMod val="40000"/>
+                <a:lumOff val="60000"/>
+              </a:schemeClr>
+            </a:solidFill>
+          </p:spPr>
+          <p:style>
+            <a:lnRef idx="2">
+              <a:schemeClr val="accent1">
+                <a:shade val="50000"/>
+              </a:schemeClr>
+            </a:lnRef>
+            <a:fillRef idx="1">
+              <a:schemeClr val="accent1"/>
+            </a:fillRef>
+            <a:effectRef idx="0">
+              <a:schemeClr val="accent1"/>
+            </a:effectRef>
+            <a:fontRef idx="minor">
+              <a:schemeClr val="lt1"/>
+            </a:fontRef>
+          </p:style>
+          <p:txBody>
+            <a:bodyPr rtlCol="0" anchor="ctr"/>
+            <a:lstStyle/>
+            <a:p>
+              <a:pPr algn="ctr"/>
+              <a:endParaRPr lang="en-US" dirty="0"/>
+            </a:p>
+          </p:txBody>
+        </p:sp>
+        <p:sp>
+          <p:nvSpPr>
+            <p:cNvPr id="65" name="Rectangle 64"/>
+            <p:cNvSpPr/>
+            <p:nvPr/>
+          </p:nvSpPr>
+          <p:spPr>
+            <a:xfrm>
+              <a:off x="8891106" y="2972475"/>
+              <a:ext cx="457599" cy="453839"/>
+            </a:xfrm>
+            <a:prstGeom prst="rect">
+              <a:avLst/>
+            </a:prstGeom>
+            <a:solidFill>
+              <a:schemeClr val="accent1">
+                <a:lumMod val="40000"/>
+                <a:lumOff val="60000"/>
+              </a:schemeClr>
+            </a:solidFill>
+          </p:spPr>
+          <p:style>
+            <a:lnRef idx="2">
+              <a:schemeClr val="accent1">
+                <a:shade val="50000"/>
+              </a:schemeClr>
+            </a:lnRef>
+            <a:fillRef idx="1">
+              <a:schemeClr val="accent1"/>
+            </a:fillRef>
+            <a:effectRef idx="0">
+              <a:schemeClr val="accent1"/>
+            </a:effectRef>
+            <a:fontRef idx="minor">
+              <a:schemeClr val="lt1"/>
+            </a:fontRef>
+          </p:style>
+          <p:txBody>
+            <a:bodyPr rtlCol="0" anchor="ctr"/>
+            <a:lstStyle/>
+            <a:p>
+              <a:pPr algn="ctr"/>
+              <a:endParaRPr lang="en-US" dirty="0"/>
+            </a:p>
+          </p:txBody>
+        </p:sp>
+        <p:sp>
+          <p:nvSpPr>
+            <p:cNvPr id="66" name="Rectangle 65"/>
+            <p:cNvSpPr/>
+            <p:nvPr/>
+          </p:nvSpPr>
+          <p:spPr>
+            <a:xfrm>
+              <a:off x="8433507" y="3426314"/>
+              <a:ext cx="457599" cy="453839"/>
+            </a:xfrm>
+            <a:prstGeom prst="rect">
+              <a:avLst/>
+            </a:prstGeom>
+            <a:solidFill>
+              <a:schemeClr val="accent1">
+                <a:lumMod val="40000"/>
+                <a:lumOff val="60000"/>
+              </a:schemeClr>
+            </a:solidFill>
+          </p:spPr>
+          <p:style>
+            <a:lnRef idx="2">
+              <a:schemeClr val="accent1">
+                <a:shade val="50000"/>
+              </a:schemeClr>
+            </a:lnRef>
+            <a:fillRef idx="1">
+              <a:schemeClr val="accent1"/>
+            </a:fillRef>
+            <a:effectRef idx="0">
+              <a:schemeClr val="accent1"/>
+            </a:effectRef>
+            <a:fontRef idx="minor">
+              <a:schemeClr val="lt1"/>
+            </a:fontRef>
+          </p:style>
+          <p:txBody>
+            <a:bodyPr rtlCol="0" anchor="ctr"/>
+            <a:lstStyle/>
+            <a:p>
+              <a:pPr algn="ctr"/>
+              <a:endParaRPr lang="en-US" dirty="0"/>
+            </a:p>
+          </p:txBody>
+        </p:sp>
+        <p:sp>
+          <p:nvSpPr>
+            <p:cNvPr id="67" name="Rectangle 66"/>
+            <p:cNvSpPr/>
+            <p:nvPr/>
+          </p:nvSpPr>
+          <p:spPr>
+            <a:xfrm>
+              <a:off x="8891106" y="3426314"/>
+              <a:ext cx="457599" cy="453839"/>
+            </a:xfrm>
+            <a:prstGeom prst="rect">
+              <a:avLst/>
+            </a:prstGeom>
+            <a:solidFill>
+              <a:schemeClr val="accent1">
+                <a:lumMod val="40000"/>
+                <a:lumOff val="60000"/>
+              </a:schemeClr>
+            </a:solidFill>
+          </p:spPr>
+          <p:style>
+            <a:lnRef idx="2">
+              <a:schemeClr val="accent1">
+                <a:shade val="50000"/>
+              </a:schemeClr>
+            </a:lnRef>
+            <a:fillRef idx="1">
+              <a:schemeClr val="accent1"/>
+            </a:fillRef>
+            <a:effectRef idx="0">
+              <a:schemeClr val="accent1"/>
+            </a:effectRef>
+            <a:fontRef idx="minor">
+              <a:schemeClr val="lt1"/>
+            </a:fontRef>
+          </p:style>
+          <p:txBody>
+            <a:bodyPr rtlCol="0" anchor="ctr"/>
+            <a:lstStyle/>
+            <a:p>
+              <a:pPr algn="ctr"/>
+              <a:endParaRPr lang="en-US" dirty="0"/>
+            </a:p>
+          </p:txBody>
+        </p:sp>
+        <p:sp>
+          <p:nvSpPr>
+            <p:cNvPr id="71" name="Rectangle 70"/>
+            <p:cNvSpPr/>
+            <p:nvPr/>
+          </p:nvSpPr>
+          <p:spPr>
+            <a:xfrm>
+              <a:off x="5688555" y="2064797"/>
+              <a:ext cx="457599" cy="453839"/>
+            </a:xfrm>
+            <a:prstGeom prst="rect">
+              <a:avLst/>
+            </a:prstGeom>
+            <a:solidFill>
+              <a:schemeClr val="accent1">
+                <a:lumMod val="40000"/>
+                <a:lumOff val="60000"/>
+              </a:schemeClr>
+            </a:solidFill>
+          </p:spPr>
+          <p:style>
+            <a:lnRef idx="2">
+              <a:schemeClr val="accent1">
+                <a:shade val="50000"/>
+              </a:schemeClr>
+            </a:lnRef>
+            <a:fillRef idx="1">
+              <a:schemeClr val="accent1"/>
+            </a:fillRef>
+            <a:effectRef idx="0">
+              <a:schemeClr val="accent1"/>
+            </a:effectRef>
+            <a:fontRef idx="minor">
+              <a:schemeClr val="lt1"/>
+            </a:fontRef>
+          </p:style>
+          <p:txBody>
+            <a:bodyPr rtlCol="0" anchor="ctr"/>
+            <a:lstStyle/>
+            <a:p>
+              <a:pPr algn="ctr"/>
+              <a:endParaRPr lang="en-US" dirty="0"/>
+            </a:p>
+          </p:txBody>
+        </p:sp>
+        <p:sp>
+          <p:nvSpPr>
+            <p:cNvPr id="72" name="Rectangle 71"/>
+            <p:cNvSpPr/>
+            <p:nvPr/>
+          </p:nvSpPr>
+          <p:spPr>
+            <a:xfrm>
+              <a:off x="6146154" y="2064797"/>
+              <a:ext cx="457599" cy="453839"/>
+            </a:xfrm>
+            <a:prstGeom prst="rect">
+              <a:avLst/>
+            </a:prstGeom>
+            <a:solidFill>
+              <a:schemeClr val="accent1">
+                <a:lumMod val="40000"/>
+                <a:lumOff val="60000"/>
+              </a:schemeClr>
+            </a:solidFill>
+          </p:spPr>
+          <p:style>
+            <a:lnRef idx="2">
+              <a:schemeClr val="accent1">
+                <a:shade val="50000"/>
+              </a:schemeClr>
+            </a:lnRef>
+            <a:fillRef idx="1">
+              <a:schemeClr val="accent1"/>
+            </a:fillRef>
+            <a:effectRef idx="0">
+              <a:schemeClr val="accent1"/>
+            </a:effectRef>
+            <a:fontRef idx="minor">
+              <a:schemeClr val="lt1"/>
+            </a:fontRef>
+          </p:style>
+          <p:txBody>
+            <a:bodyPr rtlCol="0" anchor="ctr"/>
+            <a:lstStyle/>
+            <a:p>
+              <a:pPr algn="ctr"/>
+              <a:endParaRPr lang="en-US" dirty="0"/>
+            </a:p>
+          </p:txBody>
+        </p:sp>
+        <p:sp>
+          <p:nvSpPr>
+            <p:cNvPr id="73" name="Rectangle 72"/>
+            <p:cNvSpPr/>
+            <p:nvPr/>
+          </p:nvSpPr>
+          <p:spPr>
+            <a:xfrm>
+              <a:off x="5688555" y="2972475"/>
+              <a:ext cx="457599" cy="453839"/>
+            </a:xfrm>
+            <a:prstGeom prst="rect">
+              <a:avLst/>
+            </a:prstGeom>
+            <a:solidFill>
+              <a:schemeClr val="accent1">
+                <a:lumMod val="40000"/>
+                <a:lumOff val="60000"/>
+              </a:schemeClr>
+            </a:solidFill>
+          </p:spPr>
+          <p:style>
+            <a:lnRef idx="2">
+              <a:schemeClr val="accent1">
+                <a:shade val="50000"/>
+              </a:schemeClr>
+            </a:lnRef>
+            <a:fillRef idx="1">
+              <a:schemeClr val="accent1"/>
+            </a:fillRef>
+            <a:effectRef idx="0">
+              <a:schemeClr val="accent1"/>
+            </a:effectRef>
+            <a:fontRef idx="minor">
+              <a:schemeClr val="lt1"/>
+            </a:fontRef>
+          </p:style>
+          <p:txBody>
+            <a:bodyPr rtlCol="0" anchor="ctr"/>
+            <a:lstStyle/>
+            <a:p>
+              <a:pPr algn="ctr"/>
+              <a:endParaRPr lang="en-US" dirty="0"/>
+            </a:p>
+          </p:txBody>
+        </p:sp>
+        <p:sp>
+          <p:nvSpPr>
+            <p:cNvPr id="74" name="Rectangle 73"/>
+            <p:cNvSpPr/>
+            <p:nvPr/>
+          </p:nvSpPr>
+          <p:spPr>
+            <a:xfrm>
+              <a:off x="6146154" y="2972475"/>
+              <a:ext cx="457599" cy="453839"/>
+            </a:xfrm>
+            <a:prstGeom prst="rect">
+              <a:avLst/>
+            </a:prstGeom>
+            <a:solidFill>
+              <a:schemeClr val="accent1">
+                <a:lumMod val="40000"/>
+                <a:lumOff val="60000"/>
+              </a:schemeClr>
+            </a:solidFill>
+          </p:spPr>
+          <p:style>
+            <a:lnRef idx="2">
+              <a:schemeClr val="accent1">
+                <a:shade val="50000"/>
+              </a:schemeClr>
+            </a:lnRef>
+            <a:fillRef idx="1">
+              <a:schemeClr val="accent1"/>
+            </a:fillRef>
+            <a:effectRef idx="0">
+              <a:schemeClr val="accent1"/>
+            </a:effectRef>
+            <a:fontRef idx="minor">
+              <a:schemeClr val="lt1"/>
+            </a:fontRef>
+          </p:style>
+          <p:txBody>
+            <a:bodyPr rtlCol="0" anchor="ctr"/>
+            <a:lstStyle/>
+            <a:p>
+              <a:pPr algn="ctr"/>
+              <a:endParaRPr lang="en-US" dirty="0"/>
+            </a:p>
+          </p:txBody>
+        </p:sp>
+        <p:sp>
+          <p:nvSpPr>
+            <p:cNvPr id="75" name="Rectangle 74"/>
+            <p:cNvSpPr/>
+            <p:nvPr/>
+          </p:nvSpPr>
+          <p:spPr>
+            <a:xfrm>
+              <a:off x="5688555" y="3426314"/>
+              <a:ext cx="457599" cy="453839"/>
+            </a:xfrm>
+            <a:prstGeom prst="rect">
+              <a:avLst/>
+            </a:prstGeom>
+            <a:solidFill>
+              <a:schemeClr val="accent1">
+                <a:lumMod val="40000"/>
+                <a:lumOff val="60000"/>
+              </a:schemeClr>
+            </a:solidFill>
+          </p:spPr>
+          <p:style>
+            <a:lnRef idx="2">
+              <a:schemeClr val="accent1">
+                <a:shade val="50000"/>
+              </a:schemeClr>
+            </a:lnRef>
+            <a:fillRef idx="1">
+              <a:schemeClr val="accent1"/>
+            </a:fillRef>
+            <a:effectRef idx="0">
+              <a:schemeClr val="accent1"/>
+            </a:effectRef>
+            <a:fontRef idx="minor">
+              <a:schemeClr val="lt1"/>
+            </a:fontRef>
+          </p:style>
+          <p:txBody>
+            <a:bodyPr rtlCol="0" anchor="ctr"/>
+            <a:lstStyle/>
+            <a:p>
+              <a:pPr algn="ctr"/>
+              <a:endParaRPr lang="en-US" dirty="0"/>
+            </a:p>
+          </p:txBody>
+        </p:sp>
+        <p:sp>
+          <p:nvSpPr>
+            <p:cNvPr id="76" name="Rectangle 75"/>
+            <p:cNvSpPr/>
+            <p:nvPr/>
+          </p:nvSpPr>
+          <p:spPr>
+            <a:xfrm>
+              <a:off x="6146154" y="3426314"/>
+              <a:ext cx="457599" cy="453839"/>
+            </a:xfrm>
+            <a:prstGeom prst="rect">
+              <a:avLst/>
+            </a:prstGeom>
+            <a:solidFill>
+              <a:schemeClr val="accent1">
+                <a:lumMod val="40000"/>
+                <a:lumOff val="60000"/>
+              </a:schemeClr>
+            </a:solidFill>
+          </p:spPr>
+          <p:style>
+            <a:lnRef idx="2">
+              <a:schemeClr val="accent1">
+                <a:shade val="50000"/>
+              </a:schemeClr>
+            </a:lnRef>
+            <a:fillRef idx="1">
+              <a:schemeClr val="accent1"/>
+            </a:fillRef>
+            <a:effectRef idx="0">
+              <a:schemeClr val="accent1"/>
+            </a:effectRef>
+            <a:fontRef idx="minor">
+              <a:schemeClr val="lt1"/>
+            </a:fontRef>
+          </p:style>
+          <p:txBody>
+            <a:bodyPr rtlCol="0" anchor="ctr"/>
+            <a:lstStyle/>
+            <a:p>
+              <a:pPr algn="ctr"/>
+              <a:endParaRPr lang="en-US" dirty="0"/>
+            </a:p>
+          </p:txBody>
+        </p:sp>
+        <p:sp>
+          <p:nvSpPr>
+            <p:cNvPr id="78" name="Rectangle 77"/>
+            <p:cNvSpPr/>
+            <p:nvPr/>
+          </p:nvSpPr>
+          <p:spPr>
+            <a:xfrm>
+              <a:off x="6145047" y="2518634"/>
+              <a:ext cx="457599" cy="453839"/>
+            </a:xfrm>
+            <a:prstGeom prst="rect">
+              <a:avLst/>
+            </a:prstGeom>
+            <a:solidFill>
+              <a:schemeClr val="accent6"/>
+            </a:solidFill>
+          </p:spPr>
+          <p:style>
+            <a:lnRef idx="2">
+              <a:schemeClr val="accent1">
+                <a:shade val="50000"/>
+              </a:schemeClr>
+            </a:lnRef>
+            <a:fillRef idx="1">
+              <a:schemeClr val="accent1"/>
+            </a:fillRef>
+            <a:effectRef idx="0">
+              <a:schemeClr val="accent1"/>
+            </a:effectRef>
+            <a:fontRef idx="minor">
+              <a:schemeClr val="lt1"/>
+            </a:fontRef>
+          </p:style>
+          <p:txBody>
+            <a:bodyPr rtlCol="0" anchor="ctr"/>
+            <a:lstStyle/>
+            <a:p>
+              <a:pPr algn="ctr"/>
+              <a:endParaRPr lang="en-US" dirty="0"/>
+            </a:p>
+          </p:txBody>
+        </p:sp>
+        <p:sp>
+          <p:nvSpPr>
+            <p:cNvPr id="79" name="Rectangle 78"/>
+            <p:cNvSpPr/>
+            <p:nvPr/>
+          </p:nvSpPr>
+          <p:spPr>
+            <a:xfrm>
+              <a:off x="5689194" y="2518634"/>
+              <a:ext cx="457599" cy="453839"/>
+            </a:xfrm>
+            <a:prstGeom prst="rect">
+              <a:avLst/>
+            </a:prstGeom>
+            <a:solidFill>
+              <a:schemeClr val="accent6"/>
+            </a:solidFill>
+          </p:spPr>
+          <p:style>
+            <a:lnRef idx="2">
+              <a:schemeClr val="accent1">
+                <a:shade val="50000"/>
+              </a:schemeClr>
+            </a:lnRef>
+            <a:fillRef idx="1">
+              <a:schemeClr val="accent1"/>
+            </a:fillRef>
+            <a:effectRef idx="0">
+              <a:schemeClr val="accent1"/>
+            </a:effectRef>
+            <a:fontRef idx="minor">
+              <a:schemeClr val="lt1"/>
+            </a:fontRef>
+          </p:style>
+          <p:txBody>
+            <a:bodyPr rtlCol="0" anchor="ctr"/>
+            <a:lstStyle/>
+            <a:p>
+              <a:pPr algn="ctr"/>
+              <a:endParaRPr lang="en-US" sz="900" dirty="0">
+                <a:effectLst>
+                  <a:outerShdw blurRad="38100" dist="38100" dir="2700000" algn="tl">
+                    <a:srgbClr val="000000">
+                      <a:alpha val="43137"/>
+                    </a:srgbClr>
+                  </a:outerShdw>
+                </a:effectLst>
+              </a:endParaRPr>
+            </a:p>
+          </p:txBody>
+        </p:sp>
+        <p:sp>
+          <p:nvSpPr>
+            <p:cNvPr id="82" name="Rectangle 81"/>
+            <p:cNvSpPr/>
+            <p:nvPr/>
+          </p:nvSpPr>
+          <p:spPr>
+            <a:xfrm>
+              <a:off x="5231323" y="2064797"/>
+              <a:ext cx="457599" cy="453839"/>
+            </a:xfrm>
+            <a:prstGeom prst="rect">
+              <a:avLst/>
+            </a:prstGeom>
+            <a:solidFill>
+              <a:schemeClr val="accent1">
+                <a:lumMod val="40000"/>
+                <a:lumOff val="60000"/>
+              </a:schemeClr>
+            </a:solidFill>
+          </p:spPr>
+          <p:style>
+            <a:lnRef idx="2">
+              <a:schemeClr val="accent1">
+                <a:shade val="50000"/>
+              </a:schemeClr>
+            </a:lnRef>
+            <a:fillRef idx="1">
+              <a:schemeClr val="accent1"/>
+            </a:fillRef>
+            <a:effectRef idx="0">
+              <a:schemeClr val="accent1"/>
+            </a:effectRef>
+            <a:fontRef idx="minor">
+              <a:schemeClr val="lt1"/>
+            </a:fontRef>
+          </p:style>
+          <p:txBody>
+            <a:bodyPr rtlCol="0" anchor="ctr"/>
+            <a:lstStyle/>
+            <a:p>
+              <a:pPr algn="ctr"/>
+              <a:endParaRPr lang="en-US" dirty="0"/>
+            </a:p>
+          </p:txBody>
+        </p:sp>
+        <p:sp>
+          <p:nvSpPr>
+            <p:cNvPr id="83" name="Rectangle 82"/>
+            <p:cNvSpPr/>
+            <p:nvPr/>
+          </p:nvSpPr>
+          <p:spPr>
+            <a:xfrm>
+              <a:off x="5231323" y="2518636"/>
+              <a:ext cx="457599" cy="453839"/>
+            </a:xfrm>
+            <a:prstGeom prst="rect">
+              <a:avLst/>
+            </a:prstGeom>
+            <a:solidFill>
+              <a:schemeClr val="accent6"/>
+            </a:solidFill>
+          </p:spPr>
+          <p:style>
+            <a:lnRef idx="2">
+              <a:schemeClr val="accent1">
+                <a:shade val="50000"/>
+              </a:schemeClr>
+            </a:lnRef>
+            <a:fillRef idx="1">
+              <a:schemeClr val="accent1"/>
+            </a:fillRef>
+            <a:effectRef idx="0">
+              <a:schemeClr val="accent1"/>
+            </a:effectRef>
+            <a:fontRef idx="minor">
+              <a:schemeClr val="lt1"/>
+            </a:fontRef>
+          </p:style>
+          <p:txBody>
+            <a:bodyPr rtlCol="0" anchor="ctr"/>
+            <a:lstStyle/>
+            <a:p>
+              <a:pPr algn="ctr"/>
+              <a:endParaRPr lang="en-US" dirty="0"/>
+            </a:p>
+          </p:txBody>
+        </p:sp>
+        <p:sp>
+          <p:nvSpPr>
+            <p:cNvPr id="84" name="Rectangle 83"/>
+            <p:cNvSpPr/>
+            <p:nvPr/>
+          </p:nvSpPr>
+          <p:spPr>
+            <a:xfrm>
+              <a:off x="5231323" y="2972475"/>
+              <a:ext cx="457599" cy="453839"/>
+            </a:xfrm>
+            <a:prstGeom prst="rect">
+              <a:avLst/>
+            </a:prstGeom>
+            <a:solidFill>
+              <a:schemeClr val="accent1">
+                <a:lumMod val="40000"/>
+                <a:lumOff val="60000"/>
+              </a:schemeClr>
+            </a:solidFill>
+          </p:spPr>
+          <p:style>
+            <a:lnRef idx="2">
+              <a:schemeClr val="accent1">
+                <a:shade val="50000"/>
+              </a:schemeClr>
+            </a:lnRef>
+            <a:fillRef idx="1">
+              <a:schemeClr val="accent1"/>
+            </a:fillRef>
+            <a:effectRef idx="0">
+              <a:schemeClr val="accent1"/>
+            </a:effectRef>
+            <a:fontRef idx="minor">
+              <a:schemeClr val="lt1"/>
+            </a:fontRef>
+          </p:style>
+          <p:txBody>
+            <a:bodyPr rtlCol="0" anchor="ctr"/>
+            <a:lstStyle/>
+            <a:p>
+              <a:pPr algn="ctr"/>
+              <a:endParaRPr lang="en-US" dirty="0"/>
+            </a:p>
+          </p:txBody>
+        </p:sp>
+        <p:sp>
+          <p:nvSpPr>
+            <p:cNvPr id="85" name="Rectangle 84"/>
+            <p:cNvSpPr/>
+            <p:nvPr/>
+          </p:nvSpPr>
+          <p:spPr>
+            <a:xfrm>
+              <a:off x="5231323" y="3426314"/>
+              <a:ext cx="457599" cy="453839"/>
+            </a:xfrm>
+            <a:prstGeom prst="rect">
+              <a:avLst/>
+            </a:prstGeom>
+            <a:solidFill>
+              <a:schemeClr val="accent1">
+                <a:lumMod val="40000"/>
+                <a:lumOff val="60000"/>
+              </a:schemeClr>
+            </a:solidFill>
+          </p:spPr>
+          <p:style>
+            <a:lnRef idx="2">
+              <a:schemeClr val="accent1">
+                <a:shade val="50000"/>
+              </a:schemeClr>
+            </a:lnRef>
+            <a:fillRef idx="1">
+              <a:schemeClr val="accent1"/>
+            </a:fillRef>
+            <a:effectRef idx="0">
+              <a:schemeClr val="accent1"/>
+            </a:effectRef>
+            <a:fontRef idx="minor">
+              <a:schemeClr val="lt1"/>
+            </a:fontRef>
+          </p:style>
+          <p:txBody>
+            <a:bodyPr rtlCol="0" anchor="ctr"/>
+            <a:lstStyle/>
+            <a:p>
+              <a:pPr algn="ctr"/>
+              <a:endParaRPr lang="en-US" dirty="0"/>
+            </a:p>
+          </p:txBody>
+        </p:sp>
+        <p:sp>
+          <p:nvSpPr>
+            <p:cNvPr id="86" name="Rectangle 85"/>
+            <p:cNvSpPr/>
+            <p:nvPr/>
+          </p:nvSpPr>
+          <p:spPr>
+            <a:xfrm>
+              <a:off x="6603111" y="3880153"/>
+              <a:ext cx="457599" cy="453839"/>
+            </a:xfrm>
+            <a:prstGeom prst="rect">
+              <a:avLst/>
+            </a:prstGeom>
+            <a:solidFill>
+              <a:schemeClr val="accent1">
+                <a:lumMod val="40000"/>
+                <a:lumOff val="60000"/>
+              </a:schemeClr>
+            </a:solidFill>
+          </p:spPr>
+          <p:style>
+            <a:lnRef idx="2">
+              <a:schemeClr val="accent1">
+                <a:shade val="50000"/>
+              </a:schemeClr>
+            </a:lnRef>
+            <a:fillRef idx="1">
+              <a:schemeClr val="accent1"/>
+            </a:fillRef>
+            <a:effectRef idx="0">
+              <a:schemeClr val="accent1"/>
+            </a:effectRef>
+            <a:fontRef idx="minor">
+              <a:schemeClr val="lt1"/>
+            </a:fontRef>
+          </p:style>
+          <p:txBody>
+            <a:bodyPr rtlCol="0" anchor="ctr"/>
+            <a:lstStyle/>
+            <a:p>
+              <a:pPr algn="ctr"/>
+              <a:endParaRPr lang="en-US" dirty="0"/>
+            </a:p>
+          </p:txBody>
+        </p:sp>
+        <p:sp>
+          <p:nvSpPr>
+            <p:cNvPr id="87" name="Rectangle 86"/>
+            <p:cNvSpPr/>
+            <p:nvPr/>
+          </p:nvSpPr>
+          <p:spPr>
+            <a:xfrm>
+              <a:off x="7060710" y="3880153"/>
+              <a:ext cx="457599" cy="453839"/>
+            </a:xfrm>
+            <a:prstGeom prst="rect">
+              <a:avLst/>
+            </a:prstGeom>
+            <a:solidFill>
+              <a:schemeClr val="accent1">
+                <a:lumMod val="40000"/>
+                <a:lumOff val="60000"/>
+              </a:schemeClr>
+            </a:solidFill>
+          </p:spPr>
+          <p:style>
+            <a:lnRef idx="2">
+              <a:schemeClr val="accent1">
+                <a:shade val="50000"/>
+              </a:schemeClr>
+            </a:lnRef>
+            <a:fillRef idx="1">
+              <a:schemeClr val="accent1"/>
+            </a:fillRef>
+            <a:effectRef idx="0">
+              <a:schemeClr val="accent1"/>
+            </a:effectRef>
+            <a:fontRef idx="minor">
+              <a:schemeClr val="lt1"/>
+            </a:fontRef>
+          </p:style>
+          <p:txBody>
+            <a:bodyPr rtlCol="0" anchor="ctr"/>
+            <a:lstStyle/>
+            <a:p>
+              <a:pPr algn="ctr"/>
+              <a:endParaRPr lang="en-US" dirty="0"/>
+            </a:p>
+          </p:txBody>
+        </p:sp>
+        <p:sp>
+          <p:nvSpPr>
+            <p:cNvPr id="88" name="Rectangle 87"/>
+            <p:cNvSpPr/>
+            <p:nvPr/>
+          </p:nvSpPr>
+          <p:spPr>
+            <a:xfrm>
+              <a:off x="7518309" y="3880153"/>
+              <a:ext cx="457599" cy="453839"/>
+            </a:xfrm>
+            <a:prstGeom prst="rect">
+              <a:avLst/>
+            </a:prstGeom>
+            <a:solidFill>
+              <a:schemeClr val="accent1">
+                <a:lumMod val="40000"/>
+                <a:lumOff val="60000"/>
+              </a:schemeClr>
+            </a:solidFill>
+          </p:spPr>
+          <p:style>
+            <a:lnRef idx="2">
+              <a:schemeClr val="accent1">
+                <a:shade val="50000"/>
+              </a:schemeClr>
+            </a:lnRef>
+            <a:fillRef idx="1">
+              <a:schemeClr val="accent1"/>
+            </a:fillRef>
+            <a:effectRef idx="0">
+              <a:schemeClr val="accent1"/>
+            </a:effectRef>
+            <a:fontRef idx="minor">
+              <a:schemeClr val="lt1"/>
+            </a:fontRef>
+          </p:style>
+          <p:txBody>
+            <a:bodyPr rtlCol="0" anchor="ctr"/>
+            <a:lstStyle/>
+            <a:p>
+              <a:pPr algn="ctr"/>
+              <a:endParaRPr lang="en-US" dirty="0"/>
+            </a:p>
+          </p:txBody>
+        </p:sp>
+        <p:sp>
+          <p:nvSpPr>
+            <p:cNvPr id="89" name="Rectangle 88"/>
+            <p:cNvSpPr/>
+            <p:nvPr/>
+          </p:nvSpPr>
+          <p:spPr>
+            <a:xfrm>
+              <a:off x="7975908" y="3880153"/>
+              <a:ext cx="457599" cy="453839"/>
+            </a:xfrm>
+            <a:prstGeom prst="rect">
+              <a:avLst/>
+            </a:prstGeom>
+            <a:solidFill>
+              <a:schemeClr val="accent1">
+                <a:lumMod val="40000"/>
+                <a:lumOff val="60000"/>
+              </a:schemeClr>
+            </a:solidFill>
+          </p:spPr>
+          <p:style>
+            <a:lnRef idx="2">
+              <a:schemeClr val="accent1">
+                <a:shade val="50000"/>
+              </a:schemeClr>
+            </a:lnRef>
+            <a:fillRef idx="1">
+              <a:schemeClr val="accent1"/>
+            </a:fillRef>
+            <a:effectRef idx="0">
+              <a:schemeClr val="accent1"/>
+            </a:effectRef>
+            <a:fontRef idx="minor">
+              <a:schemeClr val="lt1"/>
+            </a:fontRef>
+          </p:style>
+          <p:txBody>
+            <a:bodyPr rtlCol="0" anchor="ctr"/>
+            <a:lstStyle/>
+            <a:p>
+              <a:pPr algn="ctr"/>
+              <a:endParaRPr lang="en-US" dirty="0"/>
+            </a:p>
+          </p:txBody>
+        </p:sp>
+        <p:sp>
+          <p:nvSpPr>
+            <p:cNvPr id="90" name="Rectangle 89"/>
+            <p:cNvSpPr/>
+            <p:nvPr/>
+          </p:nvSpPr>
+          <p:spPr>
+            <a:xfrm>
+              <a:off x="8433507" y="3880153"/>
+              <a:ext cx="457599" cy="453839"/>
+            </a:xfrm>
+            <a:prstGeom prst="rect">
+              <a:avLst/>
+            </a:prstGeom>
+            <a:solidFill>
+              <a:schemeClr val="accent1">
+                <a:lumMod val="40000"/>
+                <a:lumOff val="60000"/>
+              </a:schemeClr>
+            </a:solidFill>
+          </p:spPr>
+          <p:style>
+            <a:lnRef idx="2">
+              <a:schemeClr val="accent1">
+                <a:shade val="50000"/>
+              </a:schemeClr>
+            </a:lnRef>
+            <a:fillRef idx="1">
+              <a:schemeClr val="accent1"/>
+            </a:fillRef>
+            <a:effectRef idx="0">
+              <a:schemeClr val="accent1"/>
+            </a:effectRef>
+            <a:fontRef idx="minor">
+              <a:schemeClr val="lt1"/>
+            </a:fontRef>
+          </p:style>
+          <p:txBody>
+            <a:bodyPr rtlCol="0" anchor="ctr"/>
+            <a:lstStyle/>
+            <a:p>
+              <a:pPr algn="ctr"/>
+              <a:endParaRPr lang="en-US" dirty="0"/>
+            </a:p>
+          </p:txBody>
+        </p:sp>
+        <p:sp>
+          <p:nvSpPr>
+            <p:cNvPr id="91" name="Rectangle 90"/>
+            <p:cNvSpPr/>
+            <p:nvPr/>
+          </p:nvSpPr>
+          <p:spPr>
+            <a:xfrm>
+              <a:off x="8891106" y="3880153"/>
+              <a:ext cx="457599" cy="453839"/>
+            </a:xfrm>
+            <a:prstGeom prst="rect">
+              <a:avLst/>
+            </a:prstGeom>
+            <a:solidFill>
+              <a:schemeClr val="accent1">
+                <a:lumMod val="40000"/>
+                <a:lumOff val="60000"/>
+              </a:schemeClr>
+            </a:solidFill>
+          </p:spPr>
+          <p:style>
+            <a:lnRef idx="2">
+              <a:schemeClr val="accent1">
+                <a:shade val="50000"/>
+              </a:schemeClr>
+            </a:lnRef>
+            <a:fillRef idx="1">
+              <a:schemeClr val="accent1"/>
+            </a:fillRef>
+            <a:effectRef idx="0">
+              <a:schemeClr val="accent1"/>
+            </a:effectRef>
+            <a:fontRef idx="minor">
+              <a:schemeClr val="lt1"/>
+            </a:fontRef>
+          </p:style>
+          <p:txBody>
+            <a:bodyPr rtlCol="0" anchor="ctr"/>
+            <a:lstStyle/>
+            <a:p>
+              <a:pPr algn="ctr"/>
+              <a:endParaRPr lang="en-US" dirty="0"/>
+            </a:p>
+          </p:txBody>
+        </p:sp>
+        <p:sp>
+          <p:nvSpPr>
+            <p:cNvPr id="92" name="Rectangle 91"/>
+            <p:cNvSpPr/>
+            <p:nvPr/>
+          </p:nvSpPr>
+          <p:spPr>
+            <a:xfrm>
+              <a:off x="5688555" y="3880153"/>
+              <a:ext cx="457599" cy="453839"/>
+            </a:xfrm>
+            <a:prstGeom prst="rect">
+              <a:avLst/>
+            </a:prstGeom>
+            <a:solidFill>
+              <a:schemeClr val="accent1">
+                <a:lumMod val="40000"/>
+                <a:lumOff val="60000"/>
+              </a:schemeClr>
+            </a:solidFill>
+          </p:spPr>
+          <p:style>
+            <a:lnRef idx="2">
+              <a:schemeClr val="accent1">
+                <a:shade val="50000"/>
+              </a:schemeClr>
+            </a:lnRef>
+            <a:fillRef idx="1">
+              <a:schemeClr val="accent1"/>
+            </a:fillRef>
+            <a:effectRef idx="0">
+              <a:schemeClr val="accent1"/>
+            </a:effectRef>
+            <a:fontRef idx="minor">
+              <a:schemeClr val="lt1"/>
+            </a:fontRef>
+          </p:style>
+          <p:txBody>
+            <a:bodyPr rtlCol="0" anchor="ctr"/>
+            <a:lstStyle/>
+            <a:p>
+              <a:pPr algn="ctr"/>
+              <a:endParaRPr lang="en-US" dirty="0"/>
+            </a:p>
+          </p:txBody>
+        </p:sp>
+        <p:sp>
+          <p:nvSpPr>
+            <p:cNvPr id="93" name="Rectangle 92"/>
+            <p:cNvSpPr/>
+            <p:nvPr/>
+          </p:nvSpPr>
+          <p:spPr>
+            <a:xfrm>
+              <a:off x="6146154" y="3880153"/>
+              <a:ext cx="457599" cy="453839"/>
+            </a:xfrm>
+            <a:prstGeom prst="rect">
+              <a:avLst/>
+            </a:prstGeom>
+            <a:solidFill>
+              <a:schemeClr val="accent1">
+                <a:lumMod val="40000"/>
+                <a:lumOff val="60000"/>
+              </a:schemeClr>
+            </a:solidFill>
+          </p:spPr>
+          <p:style>
+            <a:lnRef idx="2">
+              <a:schemeClr val="accent1">
+                <a:shade val="50000"/>
+              </a:schemeClr>
+            </a:lnRef>
+            <a:fillRef idx="1">
+              <a:schemeClr val="accent1"/>
+            </a:fillRef>
+            <a:effectRef idx="0">
+              <a:schemeClr val="accent1"/>
+            </a:effectRef>
+            <a:fontRef idx="minor">
+              <a:schemeClr val="lt1"/>
+            </a:fontRef>
+          </p:style>
+          <p:txBody>
+            <a:bodyPr rtlCol="0" anchor="ctr"/>
+            <a:lstStyle/>
+            <a:p>
+              <a:pPr algn="ctr"/>
+              <a:endParaRPr lang="en-US" dirty="0"/>
+            </a:p>
+          </p:txBody>
+        </p:sp>
+        <p:sp>
+          <p:nvSpPr>
+            <p:cNvPr id="94" name="Rectangle 93"/>
+            <p:cNvSpPr/>
+            <p:nvPr/>
+          </p:nvSpPr>
+          <p:spPr>
+            <a:xfrm>
+              <a:off x="5231323" y="3880153"/>
+              <a:ext cx="457599" cy="453839"/>
+            </a:xfrm>
+            <a:prstGeom prst="rect">
+              <a:avLst/>
+            </a:prstGeom>
+            <a:solidFill>
+              <a:schemeClr val="accent1">
+                <a:lumMod val="40000"/>
+                <a:lumOff val="60000"/>
+              </a:schemeClr>
+            </a:solidFill>
+          </p:spPr>
+          <p:style>
+            <a:lnRef idx="2">
+              <a:schemeClr val="accent1">
+                <a:shade val="50000"/>
+              </a:schemeClr>
+            </a:lnRef>
+            <a:fillRef idx="1">
+              <a:schemeClr val="accent1"/>
+            </a:fillRef>
+            <a:effectRef idx="0">
+              <a:schemeClr val="accent1"/>
+            </a:effectRef>
+            <a:fontRef idx="minor">
+              <a:schemeClr val="lt1"/>
+            </a:fontRef>
+          </p:style>
+          <p:txBody>
+            <a:bodyPr rtlCol="0" anchor="ctr"/>
+            <a:lstStyle/>
+            <a:p>
+              <a:pPr algn="ctr"/>
+              <a:endParaRPr lang="en-US" dirty="0"/>
+            </a:p>
+          </p:txBody>
+        </p:sp>
+        <p:sp>
+          <p:nvSpPr>
+            <p:cNvPr id="104" name="Rectangle 103"/>
+            <p:cNvSpPr/>
+            <p:nvPr/>
+          </p:nvSpPr>
+          <p:spPr>
+            <a:xfrm>
+              <a:off x="4275547" y="2064797"/>
+              <a:ext cx="457599" cy="453839"/>
+            </a:xfrm>
+            <a:prstGeom prst="rect">
+              <a:avLst/>
+            </a:prstGeom>
+            <a:solidFill>
+              <a:schemeClr val="accent1">
+                <a:lumMod val="20000"/>
+                <a:lumOff val="80000"/>
+              </a:schemeClr>
+            </a:solidFill>
+          </p:spPr>
+          <p:style>
+            <a:lnRef idx="2">
+              <a:schemeClr val="accent1">
+                <a:shade val="50000"/>
+              </a:schemeClr>
+            </a:lnRef>
+            <a:fillRef idx="1">
+              <a:schemeClr val="accent1"/>
+            </a:fillRef>
+            <a:effectRef idx="0">
+              <a:schemeClr val="accent1"/>
+            </a:effectRef>
+            <a:fontRef idx="minor">
+              <a:schemeClr val="lt1"/>
+            </a:fontRef>
+          </p:style>
+          <p:txBody>
+            <a:bodyPr rtlCol="0" anchor="ctr"/>
+            <a:lstStyle/>
+            <a:p>
+              <a:pPr algn="ctr"/>
+              <a:endParaRPr lang="en-US" dirty="0"/>
+            </a:p>
+          </p:txBody>
+        </p:sp>
+        <p:sp>
+          <p:nvSpPr>
+            <p:cNvPr id="105" name="Rectangle 104"/>
+            <p:cNvSpPr/>
+            <p:nvPr/>
+          </p:nvSpPr>
+          <p:spPr>
+            <a:xfrm>
+              <a:off x="4733146" y="2064797"/>
+              <a:ext cx="457599" cy="453839"/>
+            </a:xfrm>
+            <a:prstGeom prst="rect">
+              <a:avLst/>
+            </a:prstGeom>
+            <a:solidFill>
+              <a:schemeClr val="accent1">
+                <a:lumMod val="20000"/>
+                <a:lumOff val="80000"/>
+              </a:schemeClr>
+            </a:solidFill>
+          </p:spPr>
+          <p:style>
+            <a:lnRef idx="2">
+              <a:schemeClr val="accent1">
+                <a:shade val="50000"/>
+              </a:schemeClr>
+            </a:lnRef>
+            <a:fillRef idx="1">
+              <a:schemeClr val="accent1"/>
+            </a:fillRef>
+            <a:effectRef idx="0">
+              <a:schemeClr val="accent1"/>
+            </a:effectRef>
+            <a:fontRef idx="minor">
+              <a:schemeClr val="lt1"/>
+            </a:fontRef>
+          </p:style>
+          <p:txBody>
+            <a:bodyPr rtlCol="0" anchor="ctr"/>
+            <a:lstStyle/>
+            <a:p>
+              <a:pPr algn="ctr"/>
+              <a:endParaRPr lang="en-US" dirty="0"/>
+            </a:p>
+          </p:txBody>
+        </p:sp>
+        <p:sp>
+          <p:nvSpPr>
+            <p:cNvPr id="106" name="Rectangle 105"/>
+            <p:cNvSpPr/>
+            <p:nvPr/>
+          </p:nvSpPr>
+          <p:spPr>
+            <a:xfrm>
+              <a:off x="4275547" y="2518636"/>
+              <a:ext cx="457599" cy="453839"/>
+            </a:xfrm>
+            <a:prstGeom prst="rect">
+              <a:avLst/>
+            </a:prstGeom>
+            <a:solidFill>
+              <a:schemeClr val="accent6"/>
+            </a:solidFill>
+          </p:spPr>
+          <p:style>
+            <a:lnRef idx="2">
+              <a:schemeClr val="accent1">
+                <a:shade val="50000"/>
+              </a:schemeClr>
+            </a:lnRef>
+            <a:fillRef idx="1">
+              <a:schemeClr val="accent1"/>
+            </a:fillRef>
+            <a:effectRef idx="0">
+              <a:schemeClr val="accent1"/>
+            </a:effectRef>
+            <a:fontRef idx="minor">
+              <a:schemeClr val="lt1"/>
+            </a:fontRef>
+          </p:style>
+          <p:txBody>
+            <a:bodyPr rtlCol="0" anchor="ctr"/>
+            <a:lstStyle/>
+            <a:p>
+              <a:pPr algn="ctr"/>
+              <a:endParaRPr lang="en-US" sz="900" dirty="0"/>
+            </a:p>
+          </p:txBody>
+        </p:sp>
+        <p:sp>
+          <p:nvSpPr>
+            <p:cNvPr id="107" name="Rectangle 106"/>
+            <p:cNvSpPr/>
+            <p:nvPr/>
+          </p:nvSpPr>
+          <p:spPr>
+            <a:xfrm>
+              <a:off x="4733146" y="2518636"/>
+              <a:ext cx="457599" cy="453839"/>
+            </a:xfrm>
+            <a:prstGeom prst="rect">
+              <a:avLst/>
+            </a:prstGeom>
+            <a:solidFill>
+              <a:schemeClr val="accent6"/>
+            </a:solidFill>
+          </p:spPr>
+          <p:style>
+            <a:lnRef idx="2">
+              <a:schemeClr val="accent1">
+                <a:shade val="50000"/>
+              </a:schemeClr>
+            </a:lnRef>
+            <a:fillRef idx="1">
+              <a:schemeClr val="accent1"/>
+            </a:fillRef>
+            <a:effectRef idx="0">
+              <a:schemeClr val="accent1"/>
+            </a:effectRef>
+            <a:fontRef idx="minor">
+              <a:schemeClr val="lt1"/>
+            </a:fontRef>
+          </p:style>
+          <p:txBody>
+            <a:bodyPr rtlCol="0" anchor="ctr"/>
+            <a:lstStyle/>
+            <a:p>
+              <a:pPr algn="ctr"/>
+              <a:endParaRPr lang="en-US" dirty="0"/>
+            </a:p>
+          </p:txBody>
+        </p:sp>
+        <p:sp>
+          <p:nvSpPr>
+            <p:cNvPr id="108" name="Rectangle 107"/>
+            <p:cNvSpPr/>
+            <p:nvPr/>
+          </p:nvSpPr>
+          <p:spPr>
+            <a:xfrm>
+              <a:off x="4275547" y="2972475"/>
+              <a:ext cx="457599" cy="453839"/>
+            </a:xfrm>
+            <a:prstGeom prst="rect">
+              <a:avLst/>
+            </a:prstGeom>
+            <a:solidFill>
+              <a:schemeClr val="accent1">
+                <a:lumMod val="20000"/>
+                <a:lumOff val="80000"/>
+              </a:schemeClr>
+            </a:solidFill>
+          </p:spPr>
+          <p:style>
+            <a:lnRef idx="2">
+              <a:schemeClr val="accent1">
+                <a:shade val="50000"/>
+              </a:schemeClr>
+            </a:lnRef>
+            <a:fillRef idx="1">
+              <a:schemeClr val="accent1"/>
+            </a:fillRef>
+            <a:effectRef idx="0">
+              <a:schemeClr val="accent1"/>
+            </a:effectRef>
+            <a:fontRef idx="minor">
+              <a:schemeClr val="lt1"/>
+            </a:fontRef>
+          </p:style>
+          <p:txBody>
+            <a:bodyPr rtlCol="0" anchor="ctr"/>
+            <a:lstStyle/>
+            <a:p>
+              <a:pPr algn="ctr"/>
+              <a:endParaRPr lang="en-US" dirty="0"/>
+            </a:p>
+          </p:txBody>
+        </p:sp>
+        <p:sp>
+          <p:nvSpPr>
+            <p:cNvPr id="109" name="Rectangle 108"/>
+            <p:cNvSpPr/>
+            <p:nvPr/>
+          </p:nvSpPr>
+          <p:spPr>
+            <a:xfrm>
+              <a:off x="4733146" y="2972475"/>
+              <a:ext cx="457599" cy="453839"/>
+            </a:xfrm>
+            <a:prstGeom prst="rect">
+              <a:avLst/>
+            </a:prstGeom>
+            <a:solidFill>
+              <a:schemeClr val="accent1">
+                <a:lumMod val="20000"/>
+                <a:lumOff val="80000"/>
+              </a:schemeClr>
+            </a:solidFill>
+          </p:spPr>
+          <p:style>
+            <a:lnRef idx="2">
+              <a:schemeClr val="accent1">
+                <a:shade val="50000"/>
+              </a:schemeClr>
+            </a:lnRef>
+            <a:fillRef idx="1">
+              <a:schemeClr val="accent1"/>
+            </a:fillRef>
+            <a:effectRef idx="0">
+              <a:schemeClr val="accent1"/>
+            </a:effectRef>
+            <a:fontRef idx="minor">
+              <a:schemeClr val="lt1"/>
+            </a:fontRef>
+          </p:style>
+          <p:txBody>
+            <a:bodyPr rtlCol="0" anchor="ctr"/>
+            <a:lstStyle/>
+            <a:p>
+              <a:pPr algn="ctr"/>
+              <a:endParaRPr lang="en-US" dirty="0"/>
+            </a:p>
+          </p:txBody>
+        </p:sp>
+        <p:sp>
+          <p:nvSpPr>
+            <p:cNvPr id="110" name="Rectangle 109"/>
+            <p:cNvSpPr/>
+            <p:nvPr/>
+          </p:nvSpPr>
+          <p:spPr>
+            <a:xfrm>
+              <a:off x="4275547" y="3426314"/>
+              <a:ext cx="457599" cy="453839"/>
+            </a:xfrm>
+            <a:prstGeom prst="rect">
+              <a:avLst/>
+            </a:prstGeom>
+            <a:solidFill>
+              <a:schemeClr val="accent1">
+                <a:lumMod val="20000"/>
+                <a:lumOff val="80000"/>
+              </a:schemeClr>
+            </a:solidFill>
+          </p:spPr>
+          <p:style>
+            <a:lnRef idx="2">
+              <a:schemeClr val="accent1">
+                <a:shade val="50000"/>
+              </a:schemeClr>
+            </a:lnRef>
+            <a:fillRef idx="1">
+              <a:schemeClr val="accent1"/>
+            </a:fillRef>
+            <a:effectRef idx="0">
+              <a:schemeClr val="accent1"/>
+            </a:effectRef>
+            <a:fontRef idx="minor">
+              <a:schemeClr val="lt1"/>
+            </a:fontRef>
+          </p:style>
+          <p:txBody>
+            <a:bodyPr rtlCol="0" anchor="ctr"/>
+            <a:lstStyle/>
+            <a:p>
+              <a:pPr algn="ctr"/>
+              <a:endParaRPr lang="en-US" dirty="0"/>
+            </a:p>
+          </p:txBody>
+        </p:sp>
+        <p:sp>
+          <p:nvSpPr>
+            <p:cNvPr id="111" name="Rectangle 110"/>
+            <p:cNvSpPr/>
+            <p:nvPr/>
+          </p:nvSpPr>
+          <p:spPr>
+            <a:xfrm>
+              <a:off x="4733146" y="3426314"/>
+              <a:ext cx="457599" cy="453839"/>
+            </a:xfrm>
+            <a:prstGeom prst="rect">
+              <a:avLst/>
+            </a:prstGeom>
+            <a:solidFill>
+              <a:schemeClr val="accent1">
+                <a:lumMod val="20000"/>
+                <a:lumOff val="80000"/>
+              </a:schemeClr>
+            </a:solidFill>
+          </p:spPr>
+          <p:style>
+            <a:lnRef idx="2">
+              <a:schemeClr val="accent1">
+                <a:shade val="50000"/>
+              </a:schemeClr>
+            </a:lnRef>
+            <a:fillRef idx="1">
+              <a:schemeClr val="accent1"/>
+            </a:fillRef>
+            <a:effectRef idx="0">
+              <a:schemeClr val="accent1"/>
+            </a:effectRef>
+            <a:fontRef idx="minor">
+              <a:schemeClr val="lt1"/>
+            </a:fontRef>
+          </p:style>
+          <p:txBody>
+            <a:bodyPr rtlCol="0" anchor="ctr"/>
+            <a:lstStyle/>
+            <a:p>
+              <a:pPr algn="ctr"/>
+              <a:endParaRPr lang="en-US" dirty="0"/>
+            </a:p>
+          </p:txBody>
+        </p:sp>
+        <p:sp>
+          <p:nvSpPr>
+            <p:cNvPr id="112" name="Rectangle 111"/>
+            <p:cNvSpPr/>
+            <p:nvPr/>
+          </p:nvSpPr>
+          <p:spPr>
+            <a:xfrm>
+              <a:off x="3360991" y="2064797"/>
+              <a:ext cx="457599" cy="453839"/>
+            </a:xfrm>
+            <a:prstGeom prst="rect">
+              <a:avLst/>
+            </a:prstGeom>
+            <a:solidFill>
+              <a:schemeClr val="accent1">
+                <a:lumMod val="20000"/>
+                <a:lumOff val="80000"/>
+              </a:schemeClr>
+            </a:solidFill>
+          </p:spPr>
+          <p:style>
+            <a:lnRef idx="2">
+              <a:schemeClr val="accent1">
+                <a:shade val="50000"/>
+              </a:schemeClr>
+            </a:lnRef>
+            <a:fillRef idx="1">
+              <a:schemeClr val="accent1"/>
+            </a:fillRef>
+            <a:effectRef idx="0">
+              <a:schemeClr val="accent1"/>
+            </a:effectRef>
+            <a:fontRef idx="minor">
+              <a:schemeClr val="lt1"/>
+            </a:fontRef>
+          </p:style>
+          <p:txBody>
+            <a:bodyPr rtlCol="0" anchor="ctr"/>
+            <a:lstStyle/>
+            <a:p>
+              <a:pPr algn="ctr"/>
+              <a:endParaRPr lang="en-US" dirty="0"/>
+            </a:p>
+          </p:txBody>
+        </p:sp>
+        <p:sp>
+          <p:nvSpPr>
+            <p:cNvPr id="113" name="Rectangle 112"/>
+            <p:cNvSpPr/>
+            <p:nvPr/>
+          </p:nvSpPr>
+          <p:spPr>
+            <a:xfrm>
+              <a:off x="3818590" y="2064797"/>
+              <a:ext cx="457599" cy="453839"/>
+            </a:xfrm>
+            <a:prstGeom prst="rect">
+              <a:avLst/>
+            </a:prstGeom>
+            <a:solidFill>
+              <a:schemeClr val="accent1">
+                <a:lumMod val="20000"/>
+                <a:lumOff val="80000"/>
+              </a:schemeClr>
+            </a:solidFill>
+          </p:spPr>
+          <p:style>
+            <a:lnRef idx="2">
+              <a:schemeClr val="accent1">
+                <a:shade val="50000"/>
+              </a:schemeClr>
+            </a:lnRef>
+            <a:fillRef idx="1">
+              <a:schemeClr val="accent1"/>
+            </a:fillRef>
+            <a:effectRef idx="0">
+              <a:schemeClr val="accent1"/>
+            </a:effectRef>
+            <a:fontRef idx="minor">
+              <a:schemeClr val="lt1"/>
+            </a:fontRef>
+          </p:style>
+          <p:txBody>
+            <a:bodyPr rtlCol="0" anchor="ctr"/>
+            <a:lstStyle/>
+            <a:p>
+              <a:pPr algn="ctr"/>
+              <a:endParaRPr lang="en-US" dirty="0"/>
+            </a:p>
+          </p:txBody>
+        </p:sp>
+        <p:sp>
+          <p:nvSpPr>
+            <p:cNvPr id="114" name="Rectangle 113"/>
+            <p:cNvSpPr/>
+            <p:nvPr/>
+          </p:nvSpPr>
+          <p:spPr>
+            <a:xfrm>
+              <a:off x="3360991" y="2972475"/>
+              <a:ext cx="457599" cy="453839"/>
+            </a:xfrm>
+            <a:prstGeom prst="rect">
+              <a:avLst/>
+            </a:prstGeom>
+            <a:solidFill>
+              <a:schemeClr val="accent1">
+                <a:lumMod val="20000"/>
+                <a:lumOff val="80000"/>
+              </a:schemeClr>
+            </a:solidFill>
+          </p:spPr>
+          <p:style>
+            <a:lnRef idx="2">
+              <a:schemeClr val="accent1">
+                <a:shade val="50000"/>
+              </a:schemeClr>
+            </a:lnRef>
+            <a:fillRef idx="1">
+              <a:schemeClr val="accent1"/>
+            </a:fillRef>
+            <a:effectRef idx="0">
+              <a:schemeClr val="accent1"/>
+            </a:effectRef>
+            <a:fontRef idx="minor">
+              <a:schemeClr val="lt1"/>
+            </a:fontRef>
+          </p:style>
+          <p:txBody>
+            <a:bodyPr rtlCol="0" anchor="ctr"/>
+            <a:lstStyle/>
+            <a:p>
+              <a:pPr algn="ctr"/>
+              <a:endParaRPr lang="en-US" dirty="0"/>
+            </a:p>
+          </p:txBody>
+        </p:sp>
+        <p:sp>
+          <p:nvSpPr>
+            <p:cNvPr id="115" name="Rectangle 114"/>
+            <p:cNvSpPr/>
+            <p:nvPr/>
+          </p:nvSpPr>
+          <p:spPr>
+            <a:xfrm>
+              <a:off x="3818590" y="2972475"/>
+              <a:ext cx="457599" cy="453839"/>
+            </a:xfrm>
+            <a:prstGeom prst="rect">
+              <a:avLst/>
+            </a:prstGeom>
+            <a:solidFill>
+              <a:schemeClr val="accent1">
+                <a:lumMod val="20000"/>
+                <a:lumOff val="80000"/>
+              </a:schemeClr>
+            </a:solidFill>
+          </p:spPr>
+          <p:style>
+            <a:lnRef idx="2">
+              <a:schemeClr val="accent1">
+                <a:shade val="50000"/>
+              </a:schemeClr>
+            </a:lnRef>
+            <a:fillRef idx="1">
+              <a:schemeClr val="accent1"/>
+            </a:fillRef>
+            <a:effectRef idx="0">
+              <a:schemeClr val="accent1"/>
+            </a:effectRef>
+            <a:fontRef idx="minor">
+              <a:schemeClr val="lt1"/>
+            </a:fontRef>
+          </p:style>
+          <p:txBody>
+            <a:bodyPr rtlCol="0" anchor="ctr"/>
+            <a:lstStyle/>
+            <a:p>
+              <a:pPr algn="ctr"/>
+              <a:endParaRPr lang="en-US" dirty="0"/>
+            </a:p>
+          </p:txBody>
+        </p:sp>
+        <p:sp>
+          <p:nvSpPr>
+            <p:cNvPr id="116" name="Rectangle 115"/>
+            <p:cNvSpPr/>
+            <p:nvPr/>
+          </p:nvSpPr>
+          <p:spPr>
+            <a:xfrm>
+              <a:off x="3360991" y="3426314"/>
+              <a:ext cx="457599" cy="453839"/>
+            </a:xfrm>
+            <a:prstGeom prst="rect">
+              <a:avLst/>
+            </a:prstGeom>
+            <a:solidFill>
+              <a:schemeClr val="accent1">
+                <a:lumMod val="20000"/>
+                <a:lumOff val="80000"/>
+              </a:schemeClr>
+            </a:solidFill>
+          </p:spPr>
+          <p:style>
+            <a:lnRef idx="2">
+              <a:schemeClr val="accent1">
+                <a:shade val="50000"/>
+              </a:schemeClr>
+            </a:lnRef>
+            <a:fillRef idx="1">
+              <a:schemeClr val="accent1"/>
+            </a:fillRef>
+            <a:effectRef idx="0">
+              <a:schemeClr val="accent1"/>
+            </a:effectRef>
+            <a:fontRef idx="minor">
+              <a:schemeClr val="lt1"/>
+            </a:fontRef>
+          </p:style>
+          <p:txBody>
+            <a:bodyPr rtlCol="0" anchor="ctr"/>
+            <a:lstStyle/>
+            <a:p>
+              <a:pPr algn="ctr"/>
+              <a:endParaRPr lang="en-US" dirty="0"/>
+            </a:p>
+          </p:txBody>
+        </p:sp>
+        <p:sp>
+          <p:nvSpPr>
+            <p:cNvPr id="117" name="Rectangle 116"/>
+            <p:cNvSpPr/>
+            <p:nvPr/>
+          </p:nvSpPr>
+          <p:spPr>
+            <a:xfrm>
+              <a:off x="3818590" y="3426314"/>
+              <a:ext cx="457599" cy="453839"/>
+            </a:xfrm>
+            <a:prstGeom prst="rect">
+              <a:avLst/>
+            </a:prstGeom>
+            <a:solidFill>
+              <a:schemeClr val="accent1">
+                <a:lumMod val="20000"/>
+                <a:lumOff val="80000"/>
+              </a:schemeClr>
+            </a:solidFill>
+          </p:spPr>
+          <p:style>
+            <a:lnRef idx="2">
+              <a:schemeClr val="accent1">
+                <a:shade val="50000"/>
+              </a:schemeClr>
+            </a:lnRef>
+            <a:fillRef idx="1">
+              <a:schemeClr val="accent1"/>
+            </a:fillRef>
+            <a:effectRef idx="0">
+              <a:schemeClr val="accent1"/>
+            </a:effectRef>
+            <a:fontRef idx="minor">
+              <a:schemeClr val="lt1"/>
+            </a:fontRef>
+          </p:style>
+          <p:txBody>
+            <a:bodyPr rtlCol="0" anchor="ctr"/>
+            <a:lstStyle/>
+            <a:p>
+              <a:pPr algn="ctr"/>
+              <a:endParaRPr lang="en-US" dirty="0"/>
+            </a:p>
+          </p:txBody>
+        </p:sp>
+        <p:sp>
+          <p:nvSpPr>
+            <p:cNvPr id="118" name="Rectangle 117"/>
+            <p:cNvSpPr/>
+            <p:nvPr/>
+          </p:nvSpPr>
+          <p:spPr>
+            <a:xfrm>
+              <a:off x="3817483" y="2518634"/>
+              <a:ext cx="457599" cy="453839"/>
+            </a:xfrm>
+            <a:prstGeom prst="rect">
+              <a:avLst/>
+            </a:prstGeom>
+            <a:solidFill>
+              <a:schemeClr val="accent6"/>
+            </a:solidFill>
+          </p:spPr>
+          <p:style>
+            <a:lnRef idx="2">
+              <a:schemeClr val="accent1">
+                <a:shade val="50000"/>
+              </a:schemeClr>
+            </a:lnRef>
+            <a:fillRef idx="1">
+              <a:schemeClr val="accent1"/>
+            </a:fillRef>
+            <a:effectRef idx="0">
+              <a:schemeClr val="accent1"/>
+            </a:effectRef>
+            <a:fontRef idx="minor">
+              <a:schemeClr val="lt1"/>
+            </a:fontRef>
+          </p:style>
+          <p:txBody>
+            <a:bodyPr rtlCol="0" anchor="ctr"/>
+            <a:lstStyle/>
+            <a:p>
+              <a:pPr algn="ctr"/>
+              <a:endParaRPr lang="en-US" dirty="0"/>
+            </a:p>
+          </p:txBody>
+        </p:sp>
+        <p:sp>
+          <p:nvSpPr>
+            <p:cNvPr id="119" name="Rectangle 118"/>
+            <p:cNvSpPr/>
+            <p:nvPr/>
+          </p:nvSpPr>
+          <p:spPr>
+            <a:xfrm>
+              <a:off x="3361630" y="2518634"/>
+              <a:ext cx="457599" cy="453839"/>
+            </a:xfrm>
+            <a:prstGeom prst="rect">
+              <a:avLst/>
+            </a:prstGeom>
+            <a:solidFill>
+              <a:schemeClr val="accent6"/>
+            </a:solidFill>
+          </p:spPr>
+          <p:style>
+            <a:lnRef idx="2">
+              <a:schemeClr val="accent1">
+                <a:shade val="50000"/>
+              </a:schemeClr>
+            </a:lnRef>
+            <a:fillRef idx="1">
+              <a:schemeClr val="accent1"/>
+            </a:fillRef>
+            <a:effectRef idx="0">
+              <a:schemeClr val="accent1"/>
+            </a:effectRef>
+            <a:fontRef idx="minor">
+              <a:schemeClr val="lt1"/>
+            </a:fontRef>
+          </p:style>
+          <p:txBody>
+            <a:bodyPr rtlCol="0" anchor="ctr"/>
+            <a:lstStyle/>
+            <a:p>
+              <a:pPr algn="ctr"/>
+              <a:endParaRPr lang="en-US" sz="900" dirty="0">
+                <a:effectLst>
+                  <a:outerShdw blurRad="38100" dist="38100" dir="2700000" algn="tl">
+                    <a:srgbClr val="000000">
+                      <a:alpha val="43137"/>
+                    </a:srgbClr>
+                  </a:outerShdw>
+                </a:effectLst>
+              </a:endParaRPr>
+            </a:p>
+          </p:txBody>
+        </p:sp>
+        <p:sp>
+          <p:nvSpPr>
+            <p:cNvPr id="120" name="Rectangle 119"/>
+            <p:cNvSpPr/>
+            <p:nvPr/>
+          </p:nvSpPr>
+          <p:spPr>
+            <a:xfrm>
+              <a:off x="2903759" y="2064797"/>
+              <a:ext cx="457599" cy="453839"/>
+            </a:xfrm>
+            <a:prstGeom prst="rect">
+              <a:avLst/>
+            </a:prstGeom>
+            <a:solidFill>
+              <a:schemeClr val="accent1">
+                <a:lumMod val="20000"/>
+                <a:lumOff val="80000"/>
+              </a:schemeClr>
+            </a:solidFill>
+          </p:spPr>
+          <p:style>
+            <a:lnRef idx="2">
+              <a:schemeClr val="accent1">
+                <a:shade val="50000"/>
+              </a:schemeClr>
+            </a:lnRef>
+            <a:fillRef idx="1">
+              <a:schemeClr val="accent1"/>
+            </a:fillRef>
+            <a:effectRef idx="0">
+              <a:schemeClr val="accent1"/>
+            </a:effectRef>
+            <a:fontRef idx="minor">
+              <a:schemeClr val="lt1"/>
+            </a:fontRef>
+          </p:style>
+          <p:txBody>
+            <a:bodyPr rtlCol="0" anchor="ctr"/>
+            <a:lstStyle/>
+            <a:p>
+              <a:pPr algn="ctr"/>
+              <a:endParaRPr lang="en-US" dirty="0"/>
+            </a:p>
+          </p:txBody>
+        </p:sp>
+        <p:sp>
+          <p:nvSpPr>
+            <p:cNvPr id="121" name="Rectangle 120"/>
+            <p:cNvSpPr/>
+            <p:nvPr/>
+          </p:nvSpPr>
+          <p:spPr>
+            <a:xfrm>
+              <a:off x="2903759" y="2518636"/>
+              <a:ext cx="457599" cy="453839"/>
+            </a:xfrm>
+            <a:prstGeom prst="rect">
+              <a:avLst/>
+            </a:prstGeom>
+            <a:solidFill>
+              <a:schemeClr val="accent6"/>
+            </a:solidFill>
+          </p:spPr>
+          <p:style>
+            <a:lnRef idx="2">
+              <a:schemeClr val="accent1">
+                <a:shade val="50000"/>
+              </a:schemeClr>
+            </a:lnRef>
+            <a:fillRef idx="1">
+              <a:schemeClr val="accent1"/>
+            </a:fillRef>
+            <a:effectRef idx="0">
+              <a:schemeClr val="accent1"/>
+            </a:effectRef>
+            <a:fontRef idx="minor">
+              <a:schemeClr val="lt1"/>
+            </a:fontRef>
+          </p:style>
+          <p:txBody>
+            <a:bodyPr rtlCol="0" anchor="ctr"/>
+            <a:lstStyle/>
+            <a:p>
+              <a:pPr algn="ctr"/>
+              <a:endParaRPr lang="en-US" dirty="0"/>
+            </a:p>
+          </p:txBody>
+        </p:sp>
+        <p:sp>
+          <p:nvSpPr>
+            <p:cNvPr id="122" name="Rectangle 121"/>
+            <p:cNvSpPr/>
+            <p:nvPr/>
+          </p:nvSpPr>
+          <p:spPr>
+            <a:xfrm>
+              <a:off x="2903759" y="2972475"/>
+              <a:ext cx="457599" cy="453839"/>
+            </a:xfrm>
+            <a:prstGeom prst="rect">
+              <a:avLst/>
+            </a:prstGeom>
+            <a:solidFill>
+              <a:schemeClr val="accent1">
+                <a:lumMod val="20000"/>
+                <a:lumOff val="80000"/>
+              </a:schemeClr>
+            </a:solidFill>
+          </p:spPr>
+          <p:style>
+            <a:lnRef idx="2">
+              <a:schemeClr val="accent1">
+                <a:shade val="50000"/>
+              </a:schemeClr>
+            </a:lnRef>
+            <a:fillRef idx="1">
+              <a:schemeClr val="accent1"/>
+            </a:fillRef>
+            <a:effectRef idx="0">
+              <a:schemeClr val="accent1"/>
+            </a:effectRef>
+            <a:fontRef idx="minor">
+              <a:schemeClr val="lt1"/>
+            </a:fontRef>
+          </p:style>
+          <p:txBody>
+            <a:bodyPr rtlCol="0" anchor="ctr"/>
+            <a:lstStyle/>
+            <a:p>
+              <a:pPr algn="ctr"/>
+              <a:endParaRPr lang="en-US" dirty="0"/>
+            </a:p>
+          </p:txBody>
+        </p:sp>
+        <p:sp>
+          <p:nvSpPr>
+            <p:cNvPr id="123" name="Rectangle 122"/>
+            <p:cNvSpPr/>
+            <p:nvPr/>
+          </p:nvSpPr>
+          <p:spPr>
+            <a:xfrm>
+              <a:off x="2903759" y="3426314"/>
+              <a:ext cx="457599" cy="453839"/>
+            </a:xfrm>
+            <a:prstGeom prst="rect">
+              <a:avLst/>
+            </a:prstGeom>
+            <a:solidFill>
+              <a:schemeClr val="accent1">
+                <a:lumMod val="20000"/>
+                <a:lumOff val="80000"/>
+              </a:schemeClr>
+            </a:solidFill>
+          </p:spPr>
+          <p:style>
+            <a:lnRef idx="2">
+              <a:schemeClr val="accent1">
+                <a:shade val="50000"/>
+              </a:schemeClr>
+            </a:lnRef>
+            <a:fillRef idx="1">
+              <a:schemeClr val="accent1"/>
+            </a:fillRef>
+            <a:effectRef idx="0">
+              <a:schemeClr val="accent1"/>
+            </a:effectRef>
+            <a:fontRef idx="minor">
+              <a:schemeClr val="lt1"/>
+            </a:fontRef>
+          </p:style>
+          <p:txBody>
+            <a:bodyPr rtlCol="0" anchor="ctr"/>
+            <a:lstStyle/>
+            <a:p>
+              <a:pPr algn="ctr"/>
+              <a:endParaRPr lang="en-US" dirty="0"/>
+            </a:p>
+          </p:txBody>
+        </p:sp>
+        <p:sp>
+          <p:nvSpPr>
+            <p:cNvPr id="124" name="Rectangle 123"/>
+            <p:cNvSpPr/>
+            <p:nvPr/>
+          </p:nvSpPr>
+          <p:spPr>
+            <a:xfrm>
+              <a:off x="4275547" y="3880153"/>
+              <a:ext cx="457599" cy="453839"/>
+            </a:xfrm>
+            <a:prstGeom prst="rect">
+              <a:avLst/>
+            </a:prstGeom>
+            <a:solidFill>
+              <a:schemeClr val="accent1">
+                <a:lumMod val="20000"/>
+                <a:lumOff val="80000"/>
+              </a:schemeClr>
+            </a:solidFill>
+          </p:spPr>
+          <p:style>
+            <a:lnRef idx="2">
+              <a:schemeClr val="accent1">
+                <a:shade val="50000"/>
+              </a:schemeClr>
+            </a:lnRef>
+            <a:fillRef idx="1">
+              <a:schemeClr val="accent1"/>
+            </a:fillRef>
+            <a:effectRef idx="0">
+              <a:schemeClr val="accent1"/>
+            </a:effectRef>
+            <a:fontRef idx="minor">
+              <a:schemeClr val="lt1"/>
+            </a:fontRef>
+          </p:style>
+          <p:txBody>
+            <a:bodyPr rtlCol="0" anchor="ctr"/>
+            <a:lstStyle/>
+            <a:p>
+              <a:pPr algn="ctr"/>
+              <a:endParaRPr lang="en-US" dirty="0"/>
+            </a:p>
+          </p:txBody>
+        </p:sp>
+        <p:sp>
+          <p:nvSpPr>
+            <p:cNvPr id="125" name="Rectangle 124"/>
+            <p:cNvSpPr/>
+            <p:nvPr/>
+          </p:nvSpPr>
+          <p:spPr>
+            <a:xfrm>
+              <a:off x="4733146" y="3880153"/>
+              <a:ext cx="457599" cy="453839"/>
+            </a:xfrm>
+            <a:prstGeom prst="rect">
+              <a:avLst/>
+            </a:prstGeom>
+            <a:solidFill>
+              <a:schemeClr val="accent1">
+                <a:lumMod val="20000"/>
+                <a:lumOff val="80000"/>
+              </a:schemeClr>
+            </a:solidFill>
+          </p:spPr>
+          <p:style>
+            <a:lnRef idx="2">
+              <a:schemeClr val="accent1">
+                <a:shade val="50000"/>
+              </a:schemeClr>
+            </a:lnRef>
+            <a:fillRef idx="1">
+              <a:schemeClr val="accent1"/>
+            </a:fillRef>
+            <a:effectRef idx="0">
+              <a:schemeClr val="accent1"/>
+            </a:effectRef>
+            <a:fontRef idx="minor">
+              <a:schemeClr val="lt1"/>
+            </a:fontRef>
+          </p:style>
+          <p:txBody>
+            <a:bodyPr rtlCol="0" anchor="ctr"/>
+            <a:lstStyle/>
+            <a:p>
+              <a:pPr algn="ctr"/>
+              <a:endParaRPr lang="en-US" dirty="0"/>
+            </a:p>
+          </p:txBody>
+        </p:sp>
+        <p:sp>
+          <p:nvSpPr>
+            <p:cNvPr id="126" name="Rectangle 125"/>
+            <p:cNvSpPr/>
+            <p:nvPr/>
+          </p:nvSpPr>
+          <p:spPr>
+            <a:xfrm>
+              <a:off x="3360991" y="3880153"/>
+              <a:ext cx="457599" cy="453839"/>
+            </a:xfrm>
+            <a:prstGeom prst="rect">
+              <a:avLst/>
+            </a:prstGeom>
+            <a:solidFill>
+              <a:schemeClr val="accent1">
+                <a:lumMod val="20000"/>
+                <a:lumOff val="80000"/>
+              </a:schemeClr>
+            </a:solidFill>
+          </p:spPr>
+          <p:style>
+            <a:lnRef idx="2">
+              <a:schemeClr val="accent1">
+                <a:shade val="50000"/>
+              </a:schemeClr>
+            </a:lnRef>
+            <a:fillRef idx="1">
+              <a:schemeClr val="accent1"/>
+            </a:fillRef>
+            <a:effectRef idx="0">
+              <a:schemeClr val="accent1"/>
+            </a:effectRef>
+            <a:fontRef idx="minor">
+              <a:schemeClr val="lt1"/>
+            </a:fontRef>
+          </p:style>
+          <p:txBody>
+            <a:bodyPr rtlCol="0" anchor="ctr"/>
+            <a:lstStyle/>
+            <a:p>
+              <a:pPr algn="ctr"/>
+              <a:endParaRPr lang="en-US" dirty="0"/>
+            </a:p>
+          </p:txBody>
+        </p:sp>
+        <p:sp>
+          <p:nvSpPr>
+            <p:cNvPr id="127" name="Rectangle 126"/>
+            <p:cNvSpPr/>
+            <p:nvPr/>
+          </p:nvSpPr>
+          <p:spPr>
+            <a:xfrm>
+              <a:off x="3818590" y="3880153"/>
+              <a:ext cx="457599" cy="453839"/>
+            </a:xfrm>
+            <a:prstGeom prst="rect">
+              <a:avLst/>
+            </a:prstGeom>
+            <a:solidFill>
+              <a:schemeClr val="accent1">
+                <a:lumMod val="20000"/>
+                <a:lumOff val="80000"/>
+              </a:schemeClr>
+            </a:solidFill>
+          </p:spPr>
+          <p:style>
+            <a:lnRef idx="2">
+              <a:schemeClr val="accent1">
+                <a:shade val="50000"/>
+              </a:schemeClr>
+            </a:lnRef>
+            <a:fillRef idx="1">
+              <a:schemeClr val="accent1"/>
+            </a:fillRef>
+            <a:effectRef idx="0">
+              <a:schemeClr val="accent1"/>
+            </a:effectRef>
+            <a:fontRef idx="minor">
+              <a:schemeClr val="lt1"/>
+            </a:fontRef>
+          </p:style>
+          <p:txBody>
+            <a:bodyPr rtlCol="0" anchor="ctr"/>
+            <a:lstStyle/>
+            <a:p>
+              <a:pPr algn="ctr"/>
+              <a:endParaRPr lang="en-US" dirty="0"/>
+            </a:p>
+          </p:txBody>
+        </p:sp>
+        <p:sp>
+          <p:nvSpPr>
+            <p:cNvPr id="128" name="Rectangle 127"/>
+            <p:cNvSpPr/>
+            <p:nvPr/>
+          </p:nvSpPr>
+          <p:spPr>
+            <a:xfrm>
+              <a:off x="2903759" y="3880153"/>
+              <a:ext cx="457599" cy="453839"/>
+            </a:xfrm>
+            <a:prstGeom prst="rect">
+              <a:avLst/>
+            </a:prstGeom>
+            <a:solidFill>
+              <a:schemeClr val="accent1">
+                <a:lumMod val="20000"/>
+                <a:lumOff val="80000"/>
+              </a:schemeClr>
+            </a:solidFill>
+          </p:spPr>
+          <p:style>
+            <a:lnRef idx="2">
+              <a:schemeClr val="accent1">
+                <a:shade val="50000"/>
+              </a:schemeClr>
+            </a:lnRef>
+            <a:fillRef idx="1">
+              <a:schemeClr val="accent1"/>
+            </a:fillRef>
+            <a:effectRef idx="0">
+              <a:schemeClr val="accent1"/>
+            </a:effectRef>
+            <a:fontRef idx="minor">
+              <a:schemeClr val="lt1"/>
+            </a:fontRef>
+          </p:style>
+          <p:txBody>
+            <a:bodyPr rtlCol="0" anchor="ctr"/>
+            <a:lstStyle/>
+            <a:p>
+              <a:pPr algn="ctr"/>
+              <a:endParaRPr lang="en-US" dirty="0"/>
+            </a:p>
+          </p:txBody>
+        </p:sp>
+        <p:sp>
+          <p:nvSpPr>
+            <p:cNvPr id="129" name="Rectangle 128"/>
+            <p:cNvSpPr/>
+            <p:nvPr/>
+          </p:nvSpPr>
+          <p:spPr>
+            <a:xfrm>
+              <a:off x="8433506" y="2518634"/>
+              <a:ext cx="457599" cy="453839"/>
+            </a:xfrm>
+            <a:prstGeom prst="rect">
+              <a:avLst/>
+            </a:prstGeom>
+            <a:solidFill>
+              <a:schemeClr val="accent6"/>
+            </a:solidFill>
+          </p:spPr>
+          <p:style>
+            <a:lnRef idx="2">
+              <a:schemeClr val="accent1">
+                <a:shade val="50000"/>
+              </a:schemeClr>
+            </a:lnRef>
+            <a:fillRef idx="1">
+              <a:schemeClr val="accent1"/>
+            </a:fillRef>
+            <a:effectRef idx="0">
+              <a:schemeClr val="accent1"/>
+            </a:effectRef>
+            <a:fontRef idx="minor">
+              <a:schemeClr val="lt1"/>
+            </a:fontRef>
+          </p:style>
+          <p:txBody>
+            <a:bodyPr rtlCol="0" anchor="ctr"/>
+            <a:lstStyle/>
+            <a:p>
+              <a:pPr algn="ctr"/>
+              <a:endParaRPr lang="en-US" dirty="0"/>
+            </a:p>
+          </p:txBody>
+        </p:sp>
+        <mc:AlternateContent xmlns:mc="http://schemas.openxmlformats.org/markup-compatibility/2006" xmlns:a14="http://schemas.microsoft.com/office/drawing/2010/main">
+          <mc:Choice Requires="a14">
+            <p:sp>
+              <p:nvSpPr>
+                <p:cNvPr id="130" name="Rectangle 129"/>
+                <p:cNvSpPr/>
+                <p:nvPr/>
+              </p:nvSpPr>
+              <p:spPr>
+                <a:xfrm>
+                  <a:off x="2852946" y="1131309"/>
+                  <a:ext cx="2528812" cy="872837"/>
+                </a:xfrm>
+                <a:prstGeom prst="rect">
+                  <a:avLst/>
+                </a:prstGeom>
+                <a:noFill/>
+                <a:ln>
+                  <a:noFill/>
+                </a:ln>
+              </p:spPr>
+              <p:style>
+                <a:lnRef idx="2">
+                  <a:schemeClr val="accent1">
+                    <a:shade val="50000"/>
+                  </a:schemeClr>
+                </a:lnRef>
+                <a:fillRef idx="1">
+                  <a:schemeClr val="accent1"/>
+                </a:fillRef>
+                <a:effectRef idx="0">
+                  <a:schemeClr val="accent1"/>
+                </a:effectRef>
+                <a:fontRef idx="minor">
+                  <a:schemeClr val="lt1"/>
+                </a:fontRef>
+              </p:style>
+              <p:txBody>
+                <a:bodyPr rtlCol="0" anchor="ctr"/>
+                <a:lstStyle/>
+                <a:p>
+                  <a:pPr algn="ctr"/>
+                  <a14:m>
+                    <m:oMathPara xmlns:m="http://schemas.openxmlformats.org/officeDocument/2006/math">
+                      <m:oMathParaPr>
+                        <m:jc m:val="centerGroup"/>
+                      </m:oMathParaPr>
+                      <m:oMath xmlns:m="http://schemas.openxmlformats.org/officeDocument/2006/math">
+                        <m:sSub>
+                          <m:sSubPr>
+                            <m:ctrlPr>
+                              <a:rPr lang="en-US" b="0" i="1" smtClean="0">
+                                <a:solidFill>
+                                  <a:schemeClr val="tx1"/>
+                                </a:solidFill>
+                                <a:latin typeface="Cambria Math" panose="02040503050406030204" pitchFamily="18" charset="0"/>
+                                <a:ea typeface="Cambria Math" panose="02040503050406030204" pitchFamily="18" charset="0"/>
+                              </a:rPr>
+                            </m:ctrlPr>
+                          </m:sSubPr>
+                          <m:e>
+                            <m:r>
+                              <a:rPr lang="en-US" b="0" i="1" smtClean="0">
+                                <a:solidFill>
+                                  <a:schemeClr val="tx1"/>
+                                </a:solidFill>
+                                <a:latin typeface="Cambria Math" panose="02040503050406030204" pitchFamily="18" charset="0"/>
+                                <a:ea typeface="Cambria Math" panose="02040503050406030204" pitchFamily="18" charset="0"/>
+                              </a:rPr>
+                              <m:t>𝑇</m:t>
+                            </m:r>
+                          </m:e>
+                          <m:sub>
+                            <m:r>
+                              <a:rPr lang="en-US" b="0" i="1" smtClean="0">
+                                <a:solidFill>
+                                  <a:schemeClr val="tx1"/>
+                                </a:solidFill>
+                                <a:latin typeface="Cambria Math" panose="02040503050406030204" pitchFamily="18" charset="0"/>
+                                <a:ea typeface="Cambria Math" panose="02040503050406030204" pitchFamily="18" charset="0"/>
+                              </a:rPr>
+                              <m:t>𝑚</m:t>
+                            </m:r>
+                            <m:r>
+                              <a:rPr lang="en-US" b="0" i="1" smtClean="0">
+                                <a:solidFill>
+                                  <a:schemeClr val="tx1"/>
+                                </a:solidFill>
+                                <a:latin typeface="Cambria Math" panose="02040503050406030204" pitchFamily="18" charset="0"/>
+                                <a:ea typeface="Cambria Math" panose="02040503050406030204" pitchFamily="18" charset="0"/>
+                              </a:rPr>
+                              <m:t>×</m:t>
+                            </m:r>
+                            <m:r>
+                              <a:rPr lang="en-US" b="0" i="1" smtClean="0">
+                                <a:solidFill>
+                                  <a:schemeClr val="tx1"/>
+                                </a:solidFill>
+                                <a:latin typeface="Cambria Math" panose="02040503050406030204" pitchFamily="18" charset="0"/>
+                                <a:ea typeface="Cambria Math" panose="02040503050406030204" pitchFamily="18" charset="0"/>
+                              </a:rPr>
+                              <m:t>𝑚</m:t>
+                            </m:r>
+                          </m:sub>
+                        </m:sSub>
+                      </m:oMath>
+                    </m:oMathPara>
+                  </a14:m>
+                  <a:endParaRPr lang="en-US" dirty="0" smtClean="0">
+                    <a:solidFill>
+                      <a:schemeClr val="tx1"/>
+                    </a:solidFill>
+                    <a:latin typeface="Cambria Math" panose="02040503050406030204" pitchFamily="18" charset="0"/>
+                    <a:ea typeface="Cambria Math" panose="02040503050406030204" pitchFamily="18" charset="0"/>
+                  </a:endParaRPr>
+                </a:p>
+                <a:p>
+                  <a:pPr algn="ctr"/>
+                  <a:r>
+                    <a:rPr lang="en-US" dirty="0" smtClean="0">
+                      <a:solidFill>
+                        <a:schemeClr val="tx1"/>
+                      </a:solidFill>
+                      <a:latin typeface="Cambria Math" panose="02040503050406030204" pitchFamily="18" charset="0"/>
+                      <a:ea typeface="Cambria Math" panose="02040503050406030204" pitchFamily="18" charset="0"/>
+                    </a:rPr>
+                    <a:t>Base-state to </a:t>
+                  </a:r>
+                  <a:r>
+                    <a:rPr lang="en-US" dirty="0">
+                      <a:solidFill>
+                        <a:schemeClr val="tx1"/>
+                      </a:solidFill>
+                      <a:latin typeface="Cambria Math" panose="02040503050406030204" pitchFamily="18" charset="0"/>
+                      <a:ea typeface="Cambria Math" panose="02040503050406030204" pitchFamily="18" charset="0"/>
+                    </a:rPr>
+                    <a:t>b</a:t>
+                  </a:r>
+                  <a:r>
+                    <a:rPr lang="en-US" dirty="0" smtClean="0">
+                      <a:solidFill>
+                        <a:schemeClr val="tx1"/>
+                      </a:solidFill>
+                      <a:latin typeface="Cambria Math" panose="02040503050406030204" pitchFamily="18" charset="0"/>
+                      <a:ea typeface="Cambria Math" panose="02040503050406030204" pitchFamily="18" charset="0"/>
+                    </a:rPr>
+                    <a:t>ase-state transition matrix</a:t>
+                  </a:r>
+                  <a:endParaRPr lang="en-US" dirty="0">
+                    <a:solidFill>
+                      <a:schemeClr val="tx1"/>
+                    </a:solidFill>
+                    <a:latin typeface="Cambria Math" panose="02040503050406030204" pitchFamily="18" charset="0"/>
+                    <a:ea typeface="Cambria Math" panose="02040503050406030204" pitchFamily="18" charset="0"/>
+                  </a:endParaRPr>
+                </a:p>
+              </p:txBody>
+            </p:sp>
+          </mc:Choice>
+          <mc:Fallback xmlns="">
+            <p:sp>
+              <p:nvSpPr>
+                <p:cNvPr id="130" name="Rectangle 129"/>
+                <p:cNvSpPr>
+                  <a:spLocks noRot="1" noChangeAspect="1" noMove="1" noResize="1" noEditPoints="1" noAdjustHandles="1" noChangeArrowheads="1" noChangeShapeType="1" noTextEdit="1"/>
+                </p:cNvSpPr>
+                <p:nvPr/>
+              </p:nvSpPr>
+              <p:spPr>
+                <a:xfrm>
+                  <a:off x="2852946" y="1131309"/>
+                  <a:ext cx="2528812" cy="872837"/>
+                </a:xfrm>
+                <a:prstGeom prst="rect">
+                  <a:avLst/>
+                </a:prstGeom>
+                <a:blipFill rotWithShape="0">
+                  <a:blip r:embed="rId2"/>
+                  <a:stretch>
+                    <a:fillRect l="-1446" r="-2892" b="-12500"/>
+                  </a:stretch>
+                </a:blipFill>
+                <a:ln>
+                  <a:noFill/>
+                </a:ln>
+              </p:spPr>
+              <p:txBody>
+                <a:bodyPr/>
+                <a:lstStyle/>
+                <a:p>
+                  <a:r>
+                    <a:rPr lang="en-US">
+                      <a:noFill/>
+                    </a:rPr>
+                    <a:t> </a:t>
+                  </a:r>
+                </a:p>
+              </p:txBody>
+            </p:sp>
+          </mc:Fallback>
+        </mc:AlternateContent>
+        <mc:AlternateContent xmlns:mc="http://schemas.openxmlformats.org/markup-compatibility/2006" xmlns:a14="http://schemas.microsoft.com/office/drawing/2010/main">
+          <mc:Choice Requires="a14">
+            <p:sp>
+              <p:nvSpPr>
+                <p:cNvPr id="132" name="Rectangle 131"/>
+                <p:cNvSpPr/>
+                <p:nvPr/>
+              </p:nvSpPr>
+              <p:spPr>
+                <a:xfrm>
+                  <a:off x="6113867" y="1191534"/>
+                  <a:ext cx="2518280" cy="923637"/>
+                </a:xfrm>
+                <a:prstGeom prst="rect">
+                  <a:avLst/>
+                </a:prstGeom>
+                <a:noFill/>
+                <a:ln>
+                  <a:noFill/>
+                </a:ln>
+              </p:spPr>
+              <p:style>
+                <a:lnRef idx="2">
+                  <a:schemeClr val="accent1">
+                    <a:shade val="50000"/>
+                  </a:schemeClr>
+                </a:lnRef>
+                <a:fillRef idx="1">
+                  <a:schemeClr val="accent1"/>
+                </a:fillRef>
+                <a:effectRef idx="0">
+                  <a:schemeClr val="accent1"/>
+                </a:effectRef>
+                <a:fontRef idx="minor">
+                  <a:schemeClr val="lt1"/>
+                </a:fontRef>
+              </p:style>
+              <p:txBody>
+                <a:bodyPr rtlCol="0" anchor="ctr"/>
+                <a:lstStyle/>
+                <a:p>
+                  <a:pPr algn="ctr"/>
+                  <a14:m>
+                    <m:oMathPara xmlns:m="http://schemas.openxmlformats.org/officeDocument/2006/math">
+                      <m:oMathParaPr>
+                        <m:jc m:val="centerGroup"/>
+                      </m:oMathParaPr>
+                      <m:oMath xmlns:m="http://schemas.openxmlformats.org/officeDocument/2006/math">
+                        <m:sSub>
+                          <m:sSubPr>
+                            <m:ctrlPr>
+                              <a:rPr lang="en-US" b="0" i="1" smtClean="0">
+                                <a:solidFill>
+                                  <a:schemeClr val="tx1"/>
+                                </a:solidFill>
+                                <a:latin typeface="Cambria Math" panose="02040503050406030204" pitchFamily="18" charset="0"/>
+                                <a:ea typeface="Cambria Math" panose="02040503050406030204" pitchFamily="18" charset="0"/>
+                              </a:rPr>
+                            </m:ctrlPr>
+                          </m:sSubPr>
+                          <m:e>
+                            <m:r>
+                              <a:rPr lang="en-US" b="0" i="1" smtClean="0">
+                                <a:solidFill>
+                                  <a:schemeClr val="tx1"/>
+                                </a:solidFill>
+                                <a:latin typeface="Cambria Math" panose="02040503050406030204" pitchFamily="18" charset="0"/>
+                                <a:ea typeface="Cambria Math" panose="02040503050406030204" pitchFamily="18" charset="0"/>
+                              </a:rPr>
+                              <m:t>𝐺</m:t>
+                            </m:r>
+                          </m:e>
+                          <m:sub>
+                            <m:r>
+                              <a:rPr lang="en-US" b="0" i="1" smtClean="0">
+                                <a:solidFill>
+                                  <a:schemeClr val="tx1"/>
+                                </a:solidFill>
+                                <a:latin typeface="Cambria Math" panose="02040503050406030204" pitchFamily="18" charset="0"/>
+                                <a:ea typeface="Cambria Math" panose="02040503050406030204" pitchFamily="18" charset="0"/>
+                              </a:rPr>
+                              <m:t>𝑚</m:t>
+                            </m:r>
+                            <m:r>
+                              <a:rPr lang="en-US" b="0" i="1" smtClean="0">
+                                <a:solidFill>
+                                  <a:schemeClr val="tx1"/>
+                                </a:solidFill>
+                                <a:latin typeface="Cambria Math" panose="02040503050406030204" pitchFamily="18" charset="0"/>
+                                <a:ea typeface="Cambria Math" panose="02040503050406030204" pitchFamily="18" charset="0"/>
+                              </a:rPr>
+                              <m:t>×</m:t>
+                            </m:r>
+                            <m:r>
+                              <a:rPr lang="en-US" b="0" i="1" smtClean="0">
+                                <a:solidFill>
+                                  <a:schemeClr val="tx1"/>
+                                </a:solidFill>
+                                <a:latin typeface="Cambria Math" panose="02040503050406030204" pitchFamily="18" charset="0"/>
+                                <a:ea typeface="Cambria Math" panose="02040503050406030204" pitchFamily="18" charset="0"/>
+                              </a:rPr>
+                              <m:t>𝑘</m:t>
+                            </m:r>
+                          </m:sub>
+                        </m:sSub>
+                      </m:oMath>
+                    </m:oMathPara>
+                  </a14:m>
+                  <a:endParaRPr lang="en-US" dirty="0" smtClean="0">
+                    <a:solidFill>
+                      <a:schemeClr val="tx1"/>
+                    </a:solidFill>
+                    <a:latin typeface="Cambria Math" panose="02040503050406030204" pitchFamily="18" charset="0"/>
+                    <a:ea typeface="Cambria Math" panose="02040503050406030204" pitchFamily="18" charset="0"/>
+                  </a:endParaRPr>
+                </a:p>
+                <a:p>
+                  <a:pPr algn="ctr"/>
+                  <a:r>
+                    <a:rPr lang="en-US" dirty="0">
+                      <a:solidFill>
+                        <a:schemeClr val="tx1"/>
+                      </a:solidFill>
+                      <a:latin typeface="Cambria Math" panose="02040503050406030204" pitchFamily="18" charset="0"/>
+                      <a:ea typeface="Cambria Math" panose="02040503050406030204" pitchFamily="18" charset="0"/>
+                    </a:rPr>
+                    <a:t>Base-state to </a:t>
+                  </a:r>
+                  <a:r>
+                    <a:rPr lang="en-US" dirty="0" smtClean="0">
+                      <a:solidFill>
+                        <a:schemeClr val="tx1"/>
+                      </a:solidFill>
+                      <a:latin typeface="Cambria Math" panose="02040503050406030204" pitchFamily="18" charset="0"/>
+                      <a:ea typeface="Cambria Math" panose="02040503050406030204" pitchFamily="18" charset="0"/>
+                    </a:rPr>
+                    <a:t>sub-state </a:t>
+                  </a:r>
+                  <a:r>
+                    <a:rPr lang="en-US" dirty="0">
+                      <a:solidFill>
+                        <a:schemeClr val="tx1"/>
+                      </a:solidFill>
+                      <a:latin typeface="Cambria Math" panose="02040503050406030204" pitchFamily="18" charset="0"/>
+                      <a:ea typeface="Cambria Math" panose="02040503050406030204" pitchFamily="18" charset="0"/>
+                    </a:rPr>
+                    <a:t>transition matrix</a:t>
+                  </a:r>
+                </a:p>
+                <a:p>
+                  <a:pPr algn="ctr"/>
+                  <a:endParaRPr lang="en-US" dirty="0">
+                    <a:solidFill>
+                      <a:schemeClr val="tx1"/>
+                    </a:solidFill>
+                    <a:latin typeface="Cambria Math" panose="02040503050406030204" pitchFamily="18" charset="0"/>
+                    <a:ea typeface="Cambria Math" panose="02040503050406030204" pitchFamily="18" charset="0"/>
+                  </a:endParaRPr>
+                </a:p>
+              </p:txBody>
+            </p:sp>
+          </mc:Choice>
+          <mc:Fallback xmlns="">
+            <p:sp>
+              <p:nvSpPr>
+                <p:cNvPr id="132" name="Rectangle 131"/>
+                <p:cNvSpPr>
+                  <a:spLocks noRot="1" noChangeAspect="1" noMove="1" noResize="1" noEditPoints="1" noAdjustHandles="1" noChangeArrowheads="1" noChangeShapeType="1" noTextEdit="1"/>
+                </p:cNvSpPr>
+                <p:nvPr/>
+              </p:nvSpPr>
+              <p:spPr>
+                <a:xfrm>
+                  <a:off x="6113867" y="1191534"/>
+                  <a:ext cx="2518280" cy="923637"/>
+                </a:xfrm>
+                <a:prstGeom prst="rect">
+                  <a:avLst/>
+                </a:prstGeom>
+                <a:blipFill rotWithShape="0">
+                  <a:blip r:embed="rId3"/>
+                  <a:stretch>
+                    <a:fillRect t="-7237" r="-1211"/>
+                  </a:stretch>
+                </a:blipFill>
+                <a:ln>
+                  <a:noFill/>
+                </a:ln>
+              </p:spPr>
+              <p:txBody>
+                <a:bodyPr/>
+                <a:lstStyle/>
+                <a:p>
+                  <a:r>
+                    <a:rPr lang="en-US">
+                      <a:noFill/>
+                    </a:rPr>
+                    <a:t> </a:t>
+                  </a:r>
+                </a:p>
+              </p:txBody>
+            </p:sp>
+          </mc:Fallback>
+        </mc:AlternateContent>
+        <mc:AlternateContent xmlns:mc="http://schemas.openxmlformats.org/markup-compatibility/2006" xmlns:a14="http://schemas.microsoft.com/office/drawing/2010/main">
+          <mc:Choice Requires="a14">
+            <p:sp>
+              <p:nvSpPr>
+                <p:cNvPr id="133" name="Rectangle 132"/>
+                <p:cNvSpPr/>
+                <p:nvPr/>
+              </p:nvSpPr>
+              <p:spPr>
+                <a:xfrm>
+                  <a:off x="9673915" y="2392469"/>
+                  <a:ext cx="2627746" cy="1260764"/>
+                </a:xfrm>
+                <a:prstGeom prst="rect">
+                  <a:avLst/>
+                </a:prstGeom>
+                <a:noFill/>
+                <a:ln>
+                  <a:noFill/>
+                </a:ln>
+              </p:spPr>
+              <p:style>
+                <a:lnRef idx="2">
+                  <a:schemeClr val="accent1">
+                    <a:shade val="50000"/>
+                  </a:schemeClr>
+                </a:lnRef>
+                <a:fillRef idx="1">
+                  <a:schemeClr val="accent1"/>
+                </a:fillRef>
+                <a:effectRef idx="0">
+                  <a:schemeClr val="accent1"/>
+                </a:effectRef>
+                <a:fontRef idx="minor">
+                  <a:schemeClr val="lt1"/>
+                </a:fontRef>
+              </p:style>
+              <p:txBody>
+                <a:bodyPr rtlCol="0" anchor="ctr"/>
+                <a:lstStyle/>
+                <a:p>
+                  <a:pPr algn="ctr"/>
+                  <a14:m>
+                    <m:oMathPara xmlns:m="http://schemas.openxmlformats.org/officeDocument/2006/math">
+                      <m:oMathParaPr>
+                        <m:jc m:val="centerGroup"/>
+                      </m:oMathParaPr>
+                      <m:oMath xmlns:m="http://schemas.openxmlformats.org/officeDocument/2006/math">
+                        <m:nary>
+                          <m:naryPr>
+                            <m:chr m:val="∑"/>
+                            <m:supHide m:val="on"/>
+                            <m:ctrlPr>
+                              <a:rPr lang="en-US" sz="1600" i="1" smtClean="0">
+                                <a:solidFill>
+                                  <a:schemeClr val="tx1"/>
+                                </a:solidFill>
+                                <a:latin typeface="Cambria Math" panose="02040503050406030204" pitchFamily="18" charset="0"/>
+                                <a:ea typeface="Cambria Math" panose="02040503050406030204" pitchFamily="18" charset="0"/>
+                              </a:rPr>
+                            </m:ctrlPr>
+                          </m:naryPr>
+                          <m:sub>
+                            <m:r>
+                              <a:rPr lang="en-US" sz="1600" i="1">
+                                <a:solidFill>
+                                  <a:schemeClr val="tx1"/>
+                                </a:solidFill>
+                                <a:latin typeface="Cambria Math" panose="02040503050406030204" pitchFamily="18" charset="0"/>
+                                <a:ea typeface="Cambria Math" panose="02040503050406030204" pitchFamily="18" charset="0"/>
+                              </a:rPr>
+                              <m:t>𝑖</m:t>
+                            </m:r>
+                            <m:r>
+                              <a:rPr lang="en-US" sz="1600" i="1">
+                                <a:solidFill>
+                                  <a:schemeClr val="tx1"/>
+                                </a:solidFill>
+                                <a:latin typeface="Cambria Math" panose="02040503050406030204" pitchFamily="18" charset="0"/>
+                                <a:ea typeface="Cambria Math" panose="02040503050406030204" pitchFamily="18" charset="0"/>
+                              </a:rPr>
+                              <m:t>∈</m:t>
+                            </m:r>
+                            <m:d>
+                              <m:dPr>
+                                <m:begChr m:val="["/>
+                                <m:endChr m:val="]"/>
+                                <m:ctrlPr>
+                                  <a:rPr lang="en-US" sz="1600" i="1">
+                                    <a:solidFill>
+                                      <a:schemeClr val="tx1"/>
+                                    </a:solidFill>
+                                    <a:latin typeface="Cambria Math" panose="02040503050406030204" pitchFamily="18" charset="0"/>
+                                    <a:ea typeface="Cambria Math" panose="02040503050406030204" pitchFamily="18" charset="0"/>
+                                  </a:rPr>
+                                </m:ctrlPr>
+                              </m:dPr>
+                              <m:e>
+                                <m:r>
+                                  <a:rPr lang="en-US" sz="1600" b="0" i="1" smtClean="0">
+                                    <a:solidFill>
+                                      <a:schemeClr val="tx1"/>
+                                    </a:solidFill>
+                                    <a:latin typeface="Cambria Math" panose="02040503050406030204" pitchFamily="18" charset="0"/>
+                                    <a:ea typeface="Cambria Math" panose="02040503050406030204" pitchFamily="18" charset="0"/>
+                                  </a:rPr>
+                                  <m:t>𝑚</m:t>
+                                </m:r>
+                              </m:e>
+                            </m:d>
+                          </m:sub>
+                          <m:sup/>
+                          <m:e>
+                            <m:sSub>
+                              <m:sSubPr>
+                                <m:ctrlPr>
+                                  <a:rPr lang="en-US" sz="1600" i="1">
+                                    <a:solidFill>
+                                      <a:schemeClr val="tx1"/>
+                                    </a:solidFill>
+                                    <a:latin typeface="Cambria Math" panose="02040503050406030204" pitchFamily="18" charset="0"/>
+                                    <a:ea typeface="Cambria Math" panose="02040503050406030204" pitchFamily="18" charset="0"/>
+                                  </a:rPr>
+                                </m:ctrlPr>
+                              </m:sSubPr>
+                              <m:e>
+                                <m:r>
+                                  <a:rPr lang="en-US" sz="1600" b="0" i="1" smtClean="0">
+                                    <a:solidFill>
+                                      <a:schemeClr val="tx1"/>
+                                    </a:solidFill>
+                                    <a:latin typeface="Cambria Math" panose="02040503050406030204" pitchFamily="18" charset="0"/>
+                                    <a:ea typeface="Cambria Math" panose="02040503050406030204" pitchFamily="18" charset="0"/>
+                                  </a:rPr>
+                                  <m:t>𝑇</m:t>
+                                </m:r>
+                              </m:e>
+                              <m:sub>
+                                <m:r>
+                                  <a:rPr lang="en-US" sz="1600" i="1">
+                                    <a:solidFill>
+                                      <a:schemeClr val="tx1"/>
+                                    </a:solidFill>
+                                    <a:latin typeface="Cambria Math" panose="02040503050406030204" pitchFamily="18" charset="0"/>
+                                    <a:ea typeface="Cambria Math" panose="02040503050406030204" pitchFamily="18" charset="0"/>
+                                  </a:rPr>
+                                  <m:t>𝑗</m:t>
+                                </m:r>
+                                <m:r>
+                                  <a:rPr lang="en-US" sz="1600" i="1">
+                                    <a:solidFill>
+                                      <a:schemeClr val="tx1"/>
+                                    </a:solidFill>
+                                    <a:latin typeface="Cambria Math" panose="02040503050406030204" pitchFamily="18" charset="0"/>
+                                    <a:ea typeface="Cambria Math" panose="02040503050406030204" pitchFamily="18" charset="0"/>
+                                  </a:rPr>
+                                  <m:t>,</m:t>
+                                </m:r>
+                                <m:r>
+                                  <a:rPr lang="en-US" sz="1600" i="1">
+                                    <a:solidFill>
+                                      <a:schemeClr val="tx1"/>
+                                    </a:solidFill>
+                                    <a:latin typeface="Cambria Math" panose="02040503050406030204" pitchFamily="18" charset="0"/>
+                                    <a:ea typeface="Cambria Math" panose="02040503050406030204" pitchFamily="18" charset="0"/>
+                                  </a:rPr>
+                                  <m:t>𝑖</m:t>
+                                </m:r>
+                              </m:sub>
+                            </m:sSub>
+                          </m:e>
+                        </m:nary>
+                        <m:r>
+                          <a:rPr lang="en-US" sz="1600" b="0" i="1" smtClean="0">
+                            <a:solidFill>
+                              <a:schemeClr val="tx1"/>
+                            </a:solidFill>
+                            <a:latin typeface="Cambria Math" panose="02040503050406030204" pitchFamily="18" charset="0"/>
+                            <a:ea typeface="Cambria Math" panose="02040503050406030204" pitchFamily="18" charset="0"/>
+                          </a:rPr>
+                          <m:t>+</m:t>
+                        </m:r>
+                        <m:nary>
+                          <m:naryPr>
+                            <m:chr m:val="∑"/>
+                            <m:supHide m:val="on"/>
+                            <m:ctrlPr>
+                              <a:rPr lang="en-US" sz="1600" i="1">
+                                <a:solidFill>
+                                  <a:schemeClr val="tx1"/>
+                                </a:solidFill>
+                                <a:latin typeface="Cambria Math" panose="02040503050406030204" pitchFamily="18" charset="0"/>
+                                <a:ea typeface="Cambria Math" panose="02040503050406030204" pitchFamily="18" charset="0"/>
+                              </a:rPr>
+                            </m:ctrlPr>
+                          </m:naryPr>
+                          <m:sub>
+                            <m:r>
+                              <a:rPr lang="en-US" sz="1600" i="1">
+                                <a:solidFill>
+                                  <a:schemeClr val="tx1"/>
+                                </a:solidFill>
+                                <a:latin typeface="Cambria Math" panose="02040503050406030204" pitchFamily="18" charset="0"/>
+                                <a:ea typeface="Cambria Math" panose="02040503050406030204" pitchFamily="18" charset="0"/>
+                              </a:rPr>
+                              <m:t>𝑖</m:t>
+                            </m:r>
+                            <m:r>
+                              <a:rPr lang="en-US" sz="1600" i="1">
+                                <a:solidFill>
+                                  <a:schemeClr val="tx1"/>
+                                </a:solidFill>
+                                <a:latin typeface="Cambria Math" panose="02040503050406030204" pitchFamily="18" charset="0"/>
+                                <a:ea typeface="Cambria Math" panose="02040503050406030204" pitchFamily="18" charset="0"/>
+                              </a:rPr>
+                              <m:t>∈</m:t>
+                            </m:r>
+                            <m:d>
+                              <m:dPr>
+                                <m:begChr m:val="["/>
+                                <m:endChr m:val="]"/>
+                                <m:ctrlPr>
+                                  <a:rPr lang="en-US" sz="1600" i="1">
+                                    <a:solidFill>
+                                      <a:schemeClr val="tx1"/>
+                                    </a:solidFill>
+                                    <a:latin typeface="Cambria Math" panose="02040503050406030204" pitchFamily="18" charset="0"/>
+                                    <a:ea typeface="Cambria Math" panose="02040503050406030204" pitchFamily="18" charset="0"/>
+                                  </a:rPr>
+                                </m:ctrlPr>
+                              </m:dPr>
+                              <m:e>
+                                <m:r>
+                                  <a:rPr lang="en-US" sz="1600" i="1">
+                                    <a:solidFill>
+                                      <a:schemeClr val="tx1"/>
+                                    </a:solidFill>
+                                    <a:latin typeface="Cambria Math" panose="02040503050406030204" pitchFamily="18" charset="0"/>
+                                    <a:ea typeface="Cambria Math" panose="02040503050406030204" pitchFamily="18" charset="0"/>
+                                  </a:rPr>
+                                  <m:t>𝑘</m:t>
+                                </m:r>
+                              </m:e>
+                            </m:d>
+                          </m:sub>
+                          <m:sup/>
+                          <m:e>
+                            <m:sSub>
+                              <m:sSubPr>
+                                <m:ctrlPr>
+                                  <a:rPr lang="en-US" sz="1600" i="1">
+                                    <a:solidFill>
+                                      <a:schemeClr val="tx1"/>
+                                    </a:solidFill>
+                                    <a:latin typeface="Cambria Math" panose="02040503050406030204" pitchFamily="18" charset="0"/>
+                                    <a:ea typeface="Cambria Math" panose="02040503050406030204" pitchFamily="18" charset="0"/>
+                                  </a:rPr>
+                                </m:ctrlPr>
+                              </m:sSubPr>
+                              <m:e>
+                                <m:r>
+                                  <a:rPr lang="en-US" sz="1600" i="1">
+                                    <a:solidFill>
+                                      <a:schemeClr val="tx1"/>
+                                    </a:solidFill>
+                                    <a:latin typeface="Cambria Math" panose="02040503050406030204" pitchFamily="18" charset="0"/>
+                                    <a:ea typeface="Cambria Math" panose="02040503050406030204" pitchFamily="18" charset="0"/>
+                                  </a:rPr>
+                                  <m:t>𝐺</m:t>
+                                </m:r>
+                              </m:e>
+                              <m:sub>
+                                <m:r>
+                                  <a:rPr lang="en-US" sz="1600" i="1">
+                                    <a:solidFill>
+                                      <a:schemeClr val="tx1"/>
+                                    </a:solidFill>
+                                    <a:latin typeface="Cambria Math" panose="02040503050406030204" pitchFamily="18" charset="0"/>
+                                    <a:ea typeface="Cambria Math" panose="02040503050406030204" pitchFamily="18" charset="0"/>
+                                  </a:rPr>
+                                  <m:t>𝑗</m:t>
+                                </m:r>
+                                <m:r>
+                                  <a:rPr lang="en-US" sz="1600" i="1">
+                                    <a:solidFill>
+                                      <a:schemeClr val="tx1"/>
+                                    </a:solidFill>
+                                    <a:latin typeface="Cambria Math" panose="02040503050406030204" pitchFamily="18" charset="0"/>
+                                    <a:ea typeface="Cambria Math" panose="02040503050406030204" pitchFamily="18" charset="0"/>
+                                  </a:rPr>
+                                  <m:t>,</m:t>
+                                </m:r>
+                                <m:r>
+                                  <a:rPr lang="en-US" sz="1600" i="1">
+                                    <a:solidFill>
+                                      <a:schemeClr val="tx1"/>
+                                    </a:solidFill>
+                                    <a:latin typeface="Cambria Math" panose="02040503050406030204" pitchFamily="18" charset="0"/>
+                                    <a:ea typeface="Cambria Math" panose="02040503050406030204" pitchFamily="18" charset="0"/>
+                                  </a:rPr>
+                                  <m:t>𝑖</m:t>
+                                </m:r>
+                              </m:sub>
+                            </m:sSub>
+                          </m:e>
+                        </m:nary>
+                        <m:r>
+                          <a:rPr lang="en-US" sz="1600" b="0" i="1" smtClean="0">
+                            <a:solidFill>
+                              <a:schemeClr val="tx1"/>
+                            </a:solidFill>
+                            <a:latin typeface="Cambria Math" panose="02040503050406030204" pitchFamily="18" charset="0"/>
+                            <a:ea typeface="Cambria Math" panose="02040503050406030204" pitchFamily="18" charset="0"/>
+                          </a:rPr>
+                          <m:t>=</m:t>
+                        </m:r>
+                        <m:r>
+                          <a:rPr lang="en-US" sz="1600" b="0" i="1" smtClean="0">
+                            <a:solidFill>
+                              <a:schemeClr val="tx1"/>
+                            </a:solidFill>
+                            <a:latin typeface="Cambria Math" panose="02040503050406030204" pitchFamily="18" charset="0"/>
+                            <a:ea typeface="Cambria Math" panose="02040503050406030204" pitchFamily="18" charset="0"/>
+                          </a:rPr>
+                          <m:t>1</m:t>
+                        </m:r>
+                      </m:oMath>
+                    </m:oMathPara>
+                  </a14:m>
+                  <a:endParaRPr lang="en-US" sz="1600" dirty="0" smtClean="0">
+                    <a:solidFill>
+                      <a:schemeClr val="tx1"/>
+                    </a:solidFill>
+                    <a:latin typeface="Cambria Math" panose="02040503050406030204" pitchFamily="18" charset="0"/>
+                    <a:ea typeface="Cambria Math" panose="02040503050406030204" pitchFamily="18" charset="0"/>
+                  </a:endParaRPr>
+                </a:p>
+                <a:p>
+                  <a:pPr algn="ctr"/>
+                  <a:endParaRPr lang="en-US" sz="1600" dirty="0" smtClean="0">
+                    <a:solidFill>
+                      <a:schemeClr val="tx1"/>
+                    </a:solidFill>
+                    <a:latin typeface="Cambria Math" panose="02040503050406030204" pitchFamily="18" charset="0"/>
+                    <a:ea typeface="Cambria Math" panose="02040503050406030204" pitchFamily="18" charset="0"/>
+                  </a:endParaRPr>
+                </a:p>
+                <a:p>
+                  <a:pPr algn="ctr"/>
+                  <a:r>
+                    <a:rPr lang="en-US" sz="1600" dirty="0" smtClean="0">
+                      <a:solidFill>
+                        <a:schemeClr val="tx1"/>
+                      </a:solidFill>
+                      <a:latin typeface="Cambria Math" panose="02040503050406030204" pitchFamily="18" charset="0"/>
+                      <a:ea typeface="Cambria Math" panose="02040503050406030204" pitchFamily="18" charset="0"/>
+                    </a:rPr>
+                    <a:t>Transition probability from (j,0) to other states</a:t>
+                  </a:r>
+                  <a:endParaRPr lang="en-US" sz="1600" dirty="0">
+                    <a:solidFill>
+                      <a:schemeClr val="tx1"/>
+                    </a:solidFill>
+                    <a:latin typeface="Cambria Math" panose="02040503050406030204" pitchFamily="18" charset="0"/>
+                    <a:ea typeface="Cambria Math" panose="02040503050406030204" pitchFamily="18" charset="0"/>
+                  </a:endParaRPr>
+                </a:p>
+              </p:txBody>
+            </p:sp>
+          </mc:Choice>
+          <mc:Fallback xmlns="">
+            <p:sp>
+              <p:nvSpPr>
+                <p:cNvPr id="133" name="Rectangle 132"/>
+                <p:cNvSpPr>
+                  <a:spLocks noRot="1" noChangeAspect="1" noMove="1" noResize="1" noEditPoints="1" noAdjustHandles="1" noChangeArrowheads="1" noChangeShapeType="1" noTextEdit="1"/>
+                </p:cNvSpPr>
+                <p:nvPr/>
+              </p:nvSpPr>
+              <p:spPr>
+                <a:xfrm>
+                  <a:off x="9673915" y="2392469"/>
+                  <a:ext cx="2627746" cy="1260764"/>
+                </a:xfrm>
+                <a:prstGeom prst="rect">
+                  <a:avLst/>
+                </a:prstGeom>
+                <a:blipFill rotWithShape="0">
+                  <a:blip r:embed="rId4"/>
+                  <a:stretch>
+                    <a:fillRect r="-1856" b="-13043"/>
+                  </a:stretch>
+                </a:blipFill>
+                <a:ln>
+                  <a:noFill/>
+                </a:ln>
+              </p:spPr>
+              <p:txBody>
+                <a:bodyPr/>
+                <a:lstStyle/>
+                <a:p>
+                  <a:r>
+                    <a:rPr lang="en-US">
+                      <a:noFill/>
+                    </a:rPr>
+                    <a:t> </a:t>
+                  </a:r>
+                </a:p>
+              </p:txBody>
+            </p:sp>
+          </mc:Fallback>
+        </mc:AlternateContent>
+        <p:sp>
+          <p:nvSpPr>
+            <p:cNvPr id="134" name="Rectangle 133"/>
+            <p:cNvSpPr/>
+            <p:nvPr/>
+          </p:nvSpPr>
+          <p:spPr>
+            <a:xfrm>
+              <a:off x="9348705" y="2064797"/>
+              <a:ext cx="457599" cy="453839"/>
+            </a:xfrm>
+            <a:prstGeom prst="rect">
+              <a:avLst/>
+            </a:prstGeom>
+            <a:solidFill>
+              <a:schemeClr val="accent1">
+                <a:lumMod val="40000"/>
+                <a:lumOff val="60000"/>
+              </a:schemeClr>
+            </a:solidFill>
+          </p:spPr>
+          <p:style>
+            <a:lnRef idx="2">
+              <a:schemeClr val="accent1">
+                <a:shade val="50000"/>
+              </a:schemeClr>
+            </a:lnRef>
+            <a:fillRef idx="1">
+              <a:schemeClr val="accent1"/>
+            </a:fillRef>
+            <a:effectRef idx="0">
+              <a:schemeClr val="accent1"/>
+            </a:effectRef>
+            <a:fontRef idx="minor">
+              <a:schemeClr val="lt1"/>
+            </a:fontRef>
+          </p:style>
+          <p:txBody>
+            <a:bodyPr rtlCol="0" anchor="ctr"/>
+            <a:lstStyle/>
+            <a:p>
+              <a:pPr algn="ctr"/>
+              <a:endParaRPr lang="en-US" dirty="0"/>
+            </a:p>
+          </p:txBody>
+        </p:sp>
+        <p:sp>
+          <p:nvSpPr>
+            <p:cNvPr id="135" name="Rectangle 134"/>
+            <p:cNvSpPr/>
+            <p:nvPr/>
+          </p:nvSpPr>
+          <p:spPr>
+            <a:xfrm>
+              <a:off x="9348705" y="2518636"/>
+              <a:ext cx="457599" cy="453839"/>
+            </a:xfrm>
+            <a:prstGeom prst="rect">
+              <a:avLst/>
+            </a:prstGeom>
+            <a:solidFill>
+              <a:schemeClr val="accent6"/>
+            </a:solidFill>
+          </p:spPr>
+          <p:style>
+            <a:lnRef idx="2">
+              <a:schemeClr val="accent1">
+                <a:shade val="50000"/>
+              </a:schemeClr>
+            </a:lnRef>
+            <a:fillRef idx="1">
+              <a:schemeClr val="accent1"/>
+            </a:fillRef>
+            <a:effectRef idx="0">
+              <a:schemeClr val="accent1"/>
+            </a:effectRef>
+            <a:fontRef idx="minor">
+              <a:schemeClr val="lt1"/>
+            </a:fontRef>
+          </p:style>
+          <p:txBody>
+            <a:bodyPr rtlCol="0" anchor="ctr"/>
+            <a:lstStyle/>
+            <a:p>
+              <a:pPr algn="ctr"/>
+              <a:endParaRPr lang="en-US" dirty="0"/>
+            </a:p>
+          </p:txBody>
+        </p:sp>
+        <p:sp>
+          <p:nvSpPr>
+            <p:cNvPr id="136" name="Rectangle 135"/>
+            <p:cNvSpPr/>
+            <p:nvPr/>
+          </p:nvSpPr>
+          <p:spPr>
+            <a:xfrm>
+              <a:off x="9348705" y="2972475"/>
+              <a:ext cx="457599" cy="453839"/>
+            </a:xfrm>
+            <a:prstGeom prst="rect">
+              <a:avLst/>
+            </a:prstGeom>
+            <a:solidFill>
+              <a:schemeClr val="accent1">
+                <a:lumMod val="40000"/>
+                <a:lumOff val="60000"/>
+              </a:schemeClr>
+            </a:solidFill>
+          </p:spPr>
+          <p:style>
+            <a:lnRef idx="2">
+              <a:schemeClr val="accent1">
+                <a:shade val="50000"/>
+              </a:schemeClr>
+            </a:lnRef>
+            <a:fillRef idx="1">
+              <a:schemeClr val="accent1"/>
+            </a:fillRef>
+            <a:effectRef idx="0">
+              <a:schemeClr val="accent1"/>
+            </a:effectRef>
+            <a:fontRef idx="minor">
+              <a:schemeClr val="lt1"/>
+            </a:fontRef>
+          </p:style>
+          <p:txBody>
+            <a:bodyPr rtlCol="0" anchor="ctr"/>
+            <a:lstStyle/>
+            <a:p>
+              <a:pPr algn="ctr"/>
+              <a:endParaRPr lang="en-US" dirty="0"/>
+            </a:p>
+          </p:txBody>
+        </p:sp>
+        <p:sp>
+          <p:nvSpPr>
+            <p:cNvPr id="137" name="Rectangle 136"/>
+            <p:cNvSpPr/>
+            <p:nvPr/>
+          </p:nvSpPr>
+          <p:spPr>
+            <a:xfrm>
+              <a:off x="9348705" y="3426314"/>
+              <a:ext cx="457599" cy="453839"/>
+            </a:xfrm>
+            <a:prstGeom prst="rect">
+              <a:avLst/>
+            </a:prstGeom>
+            <a:solidFill>
+              <a:schemeClr val="accent1">
+                <a:lumMod val="40000"/>
+                <a:lumOff val="60000"/>
+              </a:schemeClr>
+            </a:solidFill>
+          </p:spPr>
+          <p:style>
+            <a:lnRef idx="2">
+              <a:schemeClr val="accent1">
+                <a:shade val="50000"/>
+              </a:schemeClr>
+            </a:lnRef>
+            <a:fillRef idx="1">
+              <a:schemeClr val="accent1"/>
+            </a:fillRef>
+            <a:effectRef idx="0">
+              <a:schemeClr val="accent1"/>
+            </a:effectRef>
+            <a:fontRef idx="minor">
+              <a:schemeClr val="lt1"/>
+            </a:fontRef>
+          </p:style>
+          <p:txBody>
+            <a:bodyPr rtlCol="0" anchor="ctr"/>
+            <a:lstStyle/>
+            <a:p>
+              <a:pPr algn="ctr"/>
+              <a:endParaRPr lang="en-US" dirty="0"/>
+            </a:p>
+          </p:txBody>
+        </p:sp>
+        <p:sp>
+          <p:nvSpPr>
+            <p:cNvPr id="138" name="Rectangle 137"/>
+            <p:cNvSpPr/>
+            <p:nvPr/>
+          </p:nvSpPr>
+          <p:spPr>
+            <a:xfrm>
+              <a:off x="9348705" y="3880153"/>
+              <a:ext cx="457599" cy="453839"/>
+            </a:xfrm>
+            <a:prstGeom prst="rect">
+              <a:avLst/>
+            </a:prstGeom>
+            <a:solidFill>
+              <a:schemeClr val="accent1">
+                <a:lumMod val="40000"/>
+                <a:lumOff val="60000"/>
+              </a:schemeClr>
+            </a:solidFill>
+          </p:spPr>
+          <p:style>
+            <a:lnRef idx="2">
+              <a:schemeClr val="accent1">
+                <a:shade val="50000"/>
+              </a:schemeClr>
+            </a:lnRef>
+            <a:fillRef idx="1">
+              <a:schemeClr val="accent1"/>
+            </a:fillRef>
+            <a:effectRef idx="0">
+              <a:schemeClr val="accent1"/>
+            </a:effectRef>
+            <a:fontRef idx="minor">
+              <a:schemeClr val="lt1"/>
+            </a:fontRef>
+          </p:style>
+          <p:txBody>
+            <a:bodyPr rtlCol="0" anchor="ctr"/>
+            <a:lstStyle/>
+            <a:p>
+              <a:pPr algn="ctr"/>
+              <a:endParaRPr lang="en-US" dirty="0"/>
+            </a:p>
+          </p:txBody>
+        </p:sp>
+        <mc:AlternateContent xmlns:mc="http://schemas.openxmlformats.org/markup-compatibility/2006" xmlns:a14="http://schemas.microsoft.com/office/drawing/2010/main">
+          <mc:Choice Requires="a14">
+            <p:sp>
+              <p:nvSpPr>
+                <p:cNvPr id="139" name="Rectangle 138"/>
+                <p:cNvSpPr/>
+                <p:nvPr/>
+              </p:nvSpPr>
+              <p:spPr>
+                <a:xfrm>
+                  <a:off x="2561530" y="2518634"/>
+                  <a:ext cx="301651" cy="394336"/>
+                </a:xfrm>
+                <a:prstGeom prst="rect">
+                  <a:avLst/>
+                </a:prstGeom>
+                <a:noFill/>
+                <a:ln>
+                  <a:noFill/>
+                </a:ln>
+              </p:spPr>
+              <p:style>
+                <a:lnRef idx="2">
+                  <a:schemeClr val="accent1">
+                    <a:shade val="50000"/>
+                  </a:schemeClr>
+                </a:lnRef>
+                <a:fillRef idx="1">
+                  <a:schemeClr val="accent1"/>
+                </a:fillRef>
+                <a:effectRef idx="0">
+                  <a:schemeClr val="accent1"/>
+                </a:effectRef>
+                <a:fontRef idx="minor">
+                  <a:schemeClr val="lt1"/>
+                </a:fontRef>
+              </p:style>
+              <p:txBody>
+                <a:bodyPr rtlCol="0" anchor="ctr"/>
+                <a:lstStyle/>
+                <a:p>
+                  <a:pPr algn="ctr"/>
+                  <a14:m>
+                    <m:oMathPara xmlns:m="http://schemas.openxmlformats.org/officeDocument/2006/math">
+                      <m:oMathParaPr>
+                        <m:jc m:val="centerGroup"/>
+                      </m:oMathParaPr>
+                      <m:oMath xmlns:m="http://schemas.openxmlformats.org/officeDocument/2006/math">
+                        <m:r>
+                          <a:rPr lang="en-US" b="0" i="1" smtClean="0">
+                            <a:solidFill>
+                              <a:schemeClr val="tx1"/>
+                            </a:solidFill>
+                            <a:latin typeface="Cambria Math" panose="02040503050406030204" pitchFamily="18" charset="0"/>
+                          </a:rPr>
+                          <m:t>𝑗</m:t>
+                        </m:r>
+                      </m:oMath>
+                    </m:oMathPara>
+                  </a14:m>
+                  <a:endParaRPr lang="en-US" dirty="0">
+                    <a:solidFill>
+                      <a:schemeClr val="tx1"/>
+                    </a:solidFill>
+                  </a:endParaRPr>
+                </a:p>
+              </p:txBody>
+            </p:sp>
+          </mc:Choice>
+          <mc:Fallback xmlns="">
+            <p:sp>
+              <p:nvSpPr>
+                <p:cNvPr id="139" name="Rectangle 138"/>
+                <p:cNvSpPr>
+                  <a:spLocks noRot="1" noChangeAspect="1" noMove="1" noResize="1" noEditPoints="1" noAdjustHandles="1" noChangeArrowheads="1" noChangeShapeType="1" noTextEdit="1"/>
+                </p:cNvSpPr>
+                <p:nvPr/>
+              </p:nvSpPr>
+              <p:spPr>
+                <a:xfrm>
+                  <a:off x="2561530" y="2518634"/>
+                  <a:ext cx="301651" cy="394336"/>
+                </a:xfrm>
+                <a:prstGeom prst="rect">
+                  <a:avLst/>
+                </a:prstGeom>
+                <a:blipFill rotWithShape="0">
+                  <a:blip r:embed="rId5"/>
+                  <a:stretch>
+                    <a:fillRect l="-8000" b="-9231"/>
+                  </a:stretch>
+                </a:blipFill>
+                <a:ln>
+                  <a:noFill/>
+                </a:ln>
+              </p:spPr>
+              <p:txBody>
+                <a:bodyPr/>
+                <a:lstStyle/>
+                <a:p>
+                  <a:r>
+                    <a:rPr lang="en-US">
+                      <a:noFill/>
+                    </a:rPr>
+                    <a:t> </a:t>
+                  </a:r>
+                </a:p>
+              </p:txBody>
+            </p:sp>
+          </mc:Fallback>
+        </mc:AlternateContent>
+      </p:grpSp>
+    </p:spTree>
+    <p:extLst>
+      <p:ext uri="{BB962C8B-B14F-4D97-AF65-F5344CB8AC3E}">
+        <p14:creationId xmlns:p14="http://schemas.microsoft.com/office/powerpoint/2010/main" val="2341031457"/>
+      </p:ext>
+    </p:extLst>
+  </p:cSld>
+  <p:clrMapOvr>
+    <a:masterClrMapping/>
+  </p:clrMapOvr>
+  <p:timing>
+    <p:tnLst>
+      <p:par>
+        <p:cTn id="1" dur="indefinite" restart="never" nodeType="tmRoot"/>
+      </p:par>
+    </p:tnLst>
+  </p:timing>
+</p:sld>
+</file>
+
+<file path=ppt/slides/slide3.xml><?xml version="1.0" encoding="utf-8"?>
+<p:sld xmlns:a="http://schemas.openxmlformats.org/drawingml/2006/main" xmlns:r="http://schemas.openxmlformats.org/officeDocument/2006/relationships" xmlns:p="http://schemas.openxmlformats.org/presentationml/2006/main">
+  <p:cSld>
+    <p:spTree>
+      <p:nvGrpSpPr>
+        <p:cNvPr id="1" name=""/>
+        <p:cNvGrpSpPr/>
+        <p:nvPr/>
+      </p:nvGrpSpPr>
+      <p:grpSpPr>
+        <a:xfrm>
+          <a:off x="0" y="0"/>
+          <a:ext cx="0" cy="0"/>
+          <a:chOff x="0" y="0"/>
+          <a:chExt cx="0" cy="0"/>
+        </a:xfrm>
+      </p:grpSpPr>
+      <p:grpSp>
+        <p:nvGrpSpPr>
           <p:cNvPr id="24" name="Group 23"/>
           <p:cNvGrpSpPr/>
           <p:nvPr/>
@@ -6096,7 +10498,13 @@
                             <a:rPr lang="en-US" b="0" i="1" dirty="0" smtClean="0">
                               <a:latin typeface="Cambria Math" panose="02040503050406030204" pitchFamily="18" charset="0"/>
                             </a:rPr>
-                            <m:t>−1</m:t>
+                            <m:t>−</m:t>
+                          </m:r>
+                          <m:r>
+                            <a:rPr lang="en-US" b="0" i="1" dirty="0" smtClean="0">
+                              <a:latin typeface="Cambria Math" panose="02040503050406030204" pitchFamily="18" charset="0"/>
+                            </a:rPr>
+                            <m:t>1</m:t>
                           </m:r>
                         </m:sub>
                       </m:sSub>
@@ -6411,7 +10819,7 @@
 </p:sld>
 </file>
 
-<file path=ppt/slides/slide3.xml><?xml version="1.0" encoding="utf-8"?>
+<file path=ppt/slides/slide4.xml><?xml version="1.0" encoding="utf-8"?>
 <p:sld xmlns:a="http://schemas.openxmlformats.org/drawingml/2006/main" xmlns:r="http://schemas.openxmlformats.org/officeDocument/2006/relationships" xmlns:p="http://schemas.openxmlformats.org/presentationml/2006/main">
   <p:cSld>
     <p:spTree>
@@ -6657,7 +11065,41 @@
                           </a:effectLst>
                           <a:latin typeface="Cambria Math" panose="02040503050406030204" pitchFamily="18" charset="0"/>
                         </a:rPr>
-                        <m:t>,1)</m:t>
+                        <m:t>,</m:t>
+                      </m:r>
+                      <m:r>
+                        <a:rPr lang="en-US" i="1">
+                          <a:ln w="0"/>
+                          <a:solidFill>
+                            <a:schemeClr val="tx1"/>
+                          </a:solidFill>
+                          <a:effectLst>
+                            <a:outerShdw blurRad="38100" dist="19050" dir="2700000" algn="tl" rotWithShape="0">
+                              <a:schemeClr val="dk1">
+                                <a:alpha val="40000"/>
+                              </a:schemeClr>
+                            </a:outerShdw>
+                          </a:effectLst>
+                          <a:latin typeface="Cambria Math" panose="02040503050406030204" pitchFamily="18" charset="0"/>
+                        </a:rPr>
+                        <m:t>1</m:t>
+                      </m:r>
+                      <m:r>
+                        <a:rPr lang="en-US" i="1">
+                          <a:ln w="0"/>
+                          <a:solidFill>
+                            <a:schemeClr val="tx1"/>
+                          </a:solidFill>
+                          <a:effectLst>
+                            <a:outerShdw blurRad="38100" dist="19050" dir="2700000" algn="tl" rotWithShape="0">
+                              <a:schemeClr val="dk1">
+                                <a:alpha val="40000"/>
+                              </a:schemeClr>
+                            </a:outerShdw>
+                          </a:effectLst>
+                          <a:latin typeface="Cambria Math" panose="02040503050406030204" pitchFamily="18" charset="0"/>
+                        </a:rPr>
+                        <m:t>)</m:t>
                       </m:r>
                     </m:oMath>
                   </m:oMathPara>
@@ -7134,7 +11576,24 @@
                           </a:effectLst>
                           <a:latin typeface="Cambria Math" panose="02040503050406030204" pitchFamily="18" charset="0"/>
                         </a:rPr>
-                        <m:t>′←</m:t>
+                        <m:t>′</m:t>
+                      </m:r>
+                      <m:r>
+                        <a:rPr lang="en-US" b="0" i="1" smtClean="0">
+                          <a:ln w="0"/>
+                          <a:solidFill>
+                            <a:schemeClr val="tx1"/>
+                          </a:solidFill>
+                          <a:effectLst>
+                            <a:outerShdw blurRad="38100" dist="19050" dir="2700000" algn="tl" rotWithShape="0">
+                              <a:schemeClr val="dk1">
+                                <a:alpha val="40000"/>
+                              </a:schemeClr>
+                            </a:outerShdw>
+                          </a:effectLst>
+                          <a:latin typeface="Cambria Math" panose="02040503050406030204" pitchFamily="18" charset="0"/>
+                        </a:rPr>
+                        <m:t>←</m:t>
                       </m:r>
                       <m:sSub>
                         <m:sSubPr>
@@ -7992,7 +12451,24 @@
                                 </a:effectLst>
                                 <a:latin typeface="Cambria Math" panose="02040503050406030204" pitchFamily="18" charset="0"/>
                               </a:rPr>
-                              <m:t>+1</m:t>
+                              <m:t>+</m:t>
+                            </m:r>
+                            <m:r>
+                              <a:rPr lang="en-US" b="0" i="1" smtClean="0">
+                                <a:ln w="0"/>
+                                <a:solidFill>
+                                  <a:schemeClr val="tx1"/>
+                                </a:solidFill>
+                                <a:effectLst>
+                                  <a:outerShdw blurRad="38100" dist="19050" dir="2700000" algn="tl" rotWithShape="0">
+                                    <a:schemeClr val="dk1">
+                                      <a:alpha val="40000"/>
+                                    </a:schemeClr>
+                                  </a:outerShdw>
+                                </a:effectLst>
+                                <a:latin typeface="Cambria Math" panose="02040503050406030204" pitchFamily="18" charset="0"/>
+                              </a:rPr>
+                              <m:t>1</m:t>
                             </m:r>
                           </m:sub>
                           <m:sup>
@@ -8199,7 +12675,13 @@
                               <a:rPr lang="en-US" b="0" i="1" smtClean="0">
                                 <a:latin typeface="Cambria Math" panose="02040503050406030204" pitchFamily="18" charset="0"/>
                               </a:rPr>
-                              <m:t>+1</m:t>
+                              <m:t>+</m:t>
+                            </m:r>
+                            <m:r>
+                              <a:rPr lang="en-US" b="0" i="1" smtClean="0">
+                                <a:latin typeface="Cambria Math" panose="02040503050406030204" pitchFamily="18" charset="0"/>
+                              </a:rPr>
+                              <m:t>1</m:t>
                             </m:r>
                           </m:sub>
                           <m:sup>
@@ -8577,7 +13059,24 @@
                                 </a:effectLst>
                                 <a:latin typeface="Cambria Math" panose="02040503050406030204" pitchFamily="18" charset="0"/>
                               </a:rPr>
-                              <m:t>+1</m:t>
+                              <m:t>+</m:t>
+                            </m:r>
+                            <m:r>
+                              <a:rPr lang="en-US" b="0" i="1" smtClean="0">
+                                <a:ln w="0"/>
+                                <a:solidFill>
+                                  <a:schemeClr val="tx1"/>
+                                </a:solidFill>
+                                <a:effectLst>
+                                  <a:outerShdw blurRad="38100" dist="19050" dir="2700000" algn="tl" rotWithShape="0">
+                                    <a:schemeClr val="dk1">
+                                      <a:alpha val="40000"/>
+                                    </a:schemeClr>
+                                  </a:outerShdw>
+                                </a:effectLst>
+                                <a:latin typeface="Cambria Math" panose="02040503050406030204" pitchFamily="18" charset="0"/>
+                              </a:rPr>
+                              <m:t>1</m:t>
                             </m:r>
                           </m:sub>
                           <m:sup>
@@ -8808,7 +13307,13 @@
                               <a:rPr lang="en-US" i="1">
                                 <a:latin typeface="Cambria Math" panose="02040503050406030204" pitchFamily="18" charset="0"/>
                               </a:rPr>
-                              <m:t> |+1</m:t>
+                              <m:t> |+</m:t>
+                            </m:r>
+                            <m:r>
+                              <a:rPr lang="en-US" i="1">
+                                <a:latin typeface="Cambria Math" panose="02040503050406030204" pitchFamily="18" charset="0"/>
+                              </a:rPr>
+                              <m:t>1</m:t>
                             </m:r>
                           </m:sub>
                           <m:sup>
@@ -9038,7 +13543,41 @@
                                 </a:effectLst>
                                 <a:latin typeface="Cambria Math" panose="02040503050406030204" pitchFamily="18" charset="0"/>
                               </a:rPr>
-                              <m:t>+1:</m:t>
+                              <m:t>+</m:t>
+                            </m:r>
+                            <m:r>
+                              <a:rPr lang="en-US" b="0" i="1" smtClean="0">
+                                <a:ln w="0"/>
+                                <a:solidFill>
+                                  <a:schemeClr val="tx1"/>
+                                </a:solidFill>
+                                <a:effectLst>
+                                  <a:outerShdw blurRad="38100" dist="19050" dir="2700000" algn="tl" rotWithShape="0">
+                                    <a:schemeClr val="dk1">
+                                      <a:alpha val="40000"/>
+                                    </a:schemeClr>
+                                  </a:outerShdw>
+                                </a:effectLst>
+                                <a:latin typeface="Cambria Math" panose="02040503050406030204" pitchFamily="18" charset="0"/>
+                              </a:rPr>
+                              <m:t>1</m:t>
+                            </m:r>
+                            <m:r>
+                              <a:rPr lang="en-US" b="0" i="1" smtClean="0">
+                                <a:ln w="0"/>
+                                <a:solidFill>
+                                  <a:schemeClr val="tx1"/>
+                                </a:solidFill>
+                                <a:effectLst>
+                                  <a:outerShdw blurRad="38100" dist="19050" dir="2700000" algn="tl" rotWithShape="0">
+                                    <a:schemeClr val="dk1">
+                                      <a:alpha val="40000"/>
+                                    </a:schemeClr>
+                                  </a:outerShdw>
+                                </a:effectLst>
+                                <a:latin typeface="Cambria Math" panose="02040503050406030204" pitchFamily="18" charset="0"/>
+                              </a:rPr>
+                              <m:t>:</m:t>
                             </m:r>
                             <m:r>
                               <a:rPr lang="en-US" b="0" i="1" smtClean="0">
@@ -9364,7 +13903,19 @@
                               <a:rPr lang="en-US" b="0" i="1" smtClean="0">
                                 <a:latin typeface="Cambria Math" panose="02040503050406030204" pitchFamily="18" charset="0"/>
                               </a:rPr>
-                              <m:t>+1:</m:t>
+                              <m:t>+</m:t>
+                            </m:r>
+                            <m:r>
+                              <a:rPr lang="en-US" b="0" i="1" smtClean="0">
+                                <a:latin typeface="Cambria Math" panose="02040503050406030204" pitchFamily="18" charset="0"/>
+                              </a:rPr>
+                              <m:t>1</m:t>
+                            </m:r>
+                            <m:r>
+                              <a:rPr lang="en-US" b="0" i="1" smtClean="0">
+                                <a:latin typeface="Cambria Math" panose="02040503050406030204" pitchFamily="18" charset="0"/>
+                              </a:rPr>
+                              <m:t>:</m:t>
                             </m:r>
                             <m:r>
                               <a:rPr lang="en-US" i="1">
@@ -9807,7 +14358,7 @@
 </p:sld>
 </file>
 
-<file path=ppt/slides/slide4.xml><?xml version="1.0" encoding="utf-8"?>
+<file path=ppt/slides/slide5.xml><?xml version="1.0" encoding="utf-8"?>
 <p:sld xmlns:a="http://schemas.openxmlformats.org/drawingml/2006/main" xmlns:r="http://schemas.openxmlformats.org/officeDocument/2006/relationships" xmlns:p="http://schemas.openxmlformats.org/presentationml/2006/main">
   <p:cSld>
     <p:spTree>
@@ -11219,7 +15770,7 @@
 </p:sld>
 </file>
 
-<file path=ppt/slides/slide5.xml><?xml version="1.0" encoding="utf-8"?>
+<file path=ppt/slides/slide6.xml><?xml version="1.0" encoding="utf-8"?>
 <p:sld xmlns:a="http://schemas.openxmlformats.org/drawingml/2006/main" xmlns:r="http://schemas.openxmlformats.org/officeDocument/2006/relationships" xmlns:p="http://schemas.openxmlformats.org/presentationml/2006/main">
   <p:cSld>
     <p:spTree>

</xml_diff>